<commit_message>
More work on each of these
</commit_message>
<xml_diff>
--- a/Design Doc Figures.pptx
+++ b/Design Doc Figures.pptx
@@ -5,11 +5,12 @@
     <p:sldMasterId id="2147483648" r:id="rId1"/>
   </p:sldMasterIdLst>
   <p:notesMasterIdLst>
-    <p:notesMasterId r:id="rId4"/>
+    <p:notesMasterId r:id="rId5"/>
   </p:notesMasterIdLst>
   <p:sldIdLst>
     <p:sldId id="256" r:id="rId2"/>
     <p:sldId id="257" r:id="rId3"/>
+    <p:sldId id="258" r:id="rId4"/>
   </p:sldIdLst>
   <p:sldSz cx="9144000" cy="6858000" type="screen4x3"/>
   <p:notesSz cx="6858000" cy="9144000"/>
@@ -620,6 +621,90 @@
     <p:extLst>
       <p:ext uri="{BB962C8B-B14F-4D97-AF65-F5344CB8AC3E}">
         <p14:creationId xmlns:p14="http://schemas.microsoft.com/office/powerpoint/2010/main" val="1772834946"/>
+      </p:ext>
+    </p:extLst>
+  </p:cSld>
+  <p:clrMapOvr>
+    <a:masterClrMapping/>
+  </p:clrMapOvr>
+</p:notes>
+</file>
+
+<file path=ppt/notesSlides/notesSlide3.xml><?xml version="1.0" encoding="utf-8"?>
+<p:notes xmlns:a="http://schemas.openxmlformats.org/drawingml/2006/main" xmlns:r="http://schemas.openxmlformats.org/officeDocument/2006/relationships" xmlns:p="http://schemas.openxmlformats.org/presentationml/2006/main">
+  <p:cSld>
+    <p:spTree>
+      <p:nvGrpSpPr>
+        <p:cNvPr id="1" name=""/>
+        <p:cNvGrpSpPr/>
+        <p:nvPr/>
+      </p:nvGrpSpPr>
+      <p:grpSpPr>
+        <a:xfrm>
+          <a:off x="0" y="0"/>
+          <a:ext cx="0" cy="0"/>
+          <a:chOff x="0" y="0"/>
+          <a:chExt cx="0" cy="0"/>
+        </a:xfrm>
+      </p:grpSpPr>
+      <p:sp>
+        <p:nvSpPr>
+          <p:cNvPr id="2" name="Slide Image Placeholder 1"/>
+          <p:cNvSpPr>
+            <a:spLocks noGrp="1" noRot="1" noChangeAspect="1"/>
+          </p:cNvSpPr>
+          <p:nvPr>
+            <p:ph type="sldImg"/>
+          </p:nvPr>
+        </p:nvSpPr>
+        <p:spPr/>
+      </p:sp>
+      <p:sp>
+        <p:nvSpPr>
+          <p:cNvPr id="3" name="Notes Placeholder 2"/>
+          <p:cNvSpPr>
+            <a:spLocks noGrp="1"/>
+          </p:cNvSpPr>
+          <p:nvPr>
+            <p:ph type="body" idx="1"/>
+          </p:nvPr>
+        </p:nvSpPr>
+        <p:spPr/>
+        <p:txBody>
+          <a:bodyPr/>
+          <a:lstStyle/>
+          <a:p>
+            <a:endParaRPr lang="en-US"/>
+          </a:p>
+        </p:txBody>
+      </p:sp>
+      <p:sp>
+        <p:nvSpPr>
+          <p:cNvPr id="4" name="Slide Number Placeholder 3"/>
+          <p:cNvSpPr>
+            <a:spLocks noGrp="1"/>
+          </p:cNvSpPr>
+          <p:nvPr>
+            <p:ph type="sldNum" sz="quarter" idx="10"/>
+          </p:nvPr>
+        </p:nvSpPr>
+        <p:spPr/>
+        <p:txBody>
+          <a:bodyPr/>
+          <a:lstStyle/>
+          <a:p>
+            <a:fld id="{D2EAA289-3988-4D7E-A66A-CDD8278F5989}" type="slidenum">
+              <a:rPr lang="en-US" smtClean="0"/>
+              <a:t>3</a:t>
+            </a:fld>
+            <a:endParaRPr lang="en-US"/>
+          </a:p>
+        </p:txBody>
+      </p:sp>
+    </p:spTree>
+    <p:extLst>
+      <p:ext uri="{BB962C8B-B14F-4D97-AF65-F5344CB8AC3E}">
+        <p14:creationId xmlns:p14="http://schemas.microsoft.com/office/powerpoint/2010/main" val="3087500864"/>
       </p:ext>
     </p:extLst>
   </p:cSld>
@@ -3625,7 +3710,7 @@
         </p:nvSpPr>
         <p:spPr>
           <a:xfrm>
-            <a:off x="2133600" y="3886200"/>
+            <a:off x="2159000" y="4419600"/>
             <a:ext cx="5105400" cy="2286000"/>
           </a:xfrm>
           <a:prstGeom prst="rect">
@@ -3669,7 +3754,7 @@
         </p:nvSpPr>
         <p:spPr>
           <a:xfrm>
-            <a:off x="533400" y="762000"/>
+            <a:off x="558800" y="1295400"/>
             <a:ext cx="3200400" cy="2286000"/>
           </a:xfrm>
           <a:prstGeom prst="rect">
@@ -3713,7 +3798,7 @@
         </p:nvSpPr>
         <p:spPr>
           <a:xfrm>
-            <a:off x="5562600" y="762000"/>
+            <a:off x="5588000" y="1295400"/>
             <a:ext cx="3200400" cy="2286000"/>
           </a:xfrm>
           <a:prstGeom prst="rect">
@@ -3760,7 +3845,7 @@
         </p:nvCxnSpPr>
         <p:spPr>
           <a:xfrm>
-            <a:off x="2133600" y="3048000"/>
+            <a:off x="2159000" y="3581400"/>
             <a:ext cx="2552700" cy="838200"/>
           </a:xfrm>
           <a:prstGeom prst="straightConnector1">
@@ -3800,7 +3885,7 @@
         </p:nvCxnSpPr>
         <p:spPr>
           <a:xfrm flipV="1">
-            <a:off x="4686300" y="3048000"/>
+            <a:off x="4711700" y="3581400"/>
             <a:ext cx="2476500" cy="838200"/>
           </a:xfrm>
           <a:prstGeom prst="straightConnector1">
@@ -3829,6 +3914,43 @@
           </a:fontRef>
         </p:style>
       </p:cxnSp>
+      <p:sp>
+        <p:nvSpPr>
+          <p:cNvPr id="11" name="TextBox 10"/>
+          <p:cNvSpPr txBox="1"/>
+          <p:nvPr/>
+        </p:nvSpPr>
+        <p:spPr>
+          <a:xfrm>
+            <a:off x="2819400" y="152400"/>
+            <a:ext cx="3581400" cy="1015663"/>
+          </a:xfrm>
+          <a:prstGeom prst="rect">
+            <a:avLst/>
+          </a:prstGeom>
+          <a:noFill/>
+        </p:spPr>
+        <p:txBody>
+          <a:bodyPr wrap="square" rtlCol="0">
+            <a:spAutoFit/>
+          </a:bodyPr>
+          <a:lstStyle/>
+          <a:p>
+            <a:pPr algn="ctr"/>
+            <a:r>
+              <a:rPr lang="en-US" sz="2000" dirty="0" smtClean="0"/>
+              <a:t>Basic Client/Server Interaction For</a:t>
+            </a:r>
+          </a:p>
+          <a:p>
+            <a:pPr algn="ctr"/>
+            <a:r>
+              <a:rPr lang="en-US" sz="2000" dirty="0" smtClean="0"/>
+              <a:t>Multiplayer Game</a:t>
+            </a:r>
+          </a:p>
+        </p:txBody>
+      </p:sp>
     </p:spTree>
     <p:extLst>
       <p:ext uri="{BB962C8B-B14F-4D97-AF65-F5344CB8AC3E}">
@@ -5466,6 +5588,432 @@
     <p:extLst>
       <p:ext uri="{BB962C8B-B14F-4D97-AF65-F5344CB8AC3E}">
         <p14:creationId xmlns:p14="http://schemas.microsoft.com/office/powerpoint/2010/main" val="1703444929"/>
+      </p:ext>
+    </p:extLst>
+  </p:cSld>
+  <p:clrMapOvr>
+    <a:masterClrMapping/>
+  </p:clrMapOvr>
+</p:sld>
+</file>
+
+<file path=ppt/slides/slide3.xml><?xml version="1.0" encoding="utf-8"?>
+<p:sld xmlns:a="http://schemas.openxmlformats.org/drawingml/2006/main" xmlns:r="http://schemas.openxmlformats.org/officeDocument/2006/relationships" xmlns:p="http://schemas.openxmlformats.org/presentationml/2006/main">
+  <p:cSld>
+    <p:spTree>
+      <p:nvGrpSpPr>
+        <p:cNvPr id="1" name=""/>
+        <p:cNvGrpSpPr/>
+        <p:nvPr/>
+      </p:nvGrpSpPr>
+      <p:grpSpPr>
+        <a:xfrm>
+          <a:off x="0" y="0"/>
+          <a:ext cx="0" cy="0"/>
+          <a:chOff x="0" y="0"/>
+          <a:chExt cx="0" cy="0"/>
+        </a:xfrm>
+      </p:grpSpPr>
+      <p:sp>
+        <p:nvSpPr>
+          <p:cNvPr id="4" name="Rectangle 3"/>
+          <p:cNvSpPr/>
+          <p:nvPr/>
+        </p:nvSpPr>
+        <p:spPr>
+          <a:xfrm>
+            <a:off x="1143000" y="852269"/>
+            <a:ext cx="7086600" cy="4876800"/>
+          </a:xfrm>
+          <a:prstGeom prst="rect">
+            <a:avLst/>
+          </a:prstGeom>
+          <a:solidFill>
+            <a:schemeClr val="bg1"/>
+          </a:solidFill>
+        </p:spPr>
+        <p:style>
+          <a:lnRef idx="2">
+            <a:schemeClr val="accent1">
+              <a:shade val="50000"/>
+            </a:schemeClr>
+          </a:lnRef>
+          <a:fillRef idx="1">
+            <a:schemeClr val="accent1"/>
+          </a:fillRef>
+          <a:effectRef idx="0">
+            <a:schemeClr val="accent1"/>
+          </a:effectRef>
+          <a:fontRef idx="minor">
+            <a:schemeClr val="lt1"/>
+          </a:fontRef>
+        </p:style>
+        <p:txBody>
+          <a:bodyPr rtlCol="0" anchor="ctr"/>
+          <a:lstStyle/>
+          <a:p>
+            <a:pPr algn="ctr"/>
+            <a:endParaRPr lang="en-US"/>
+          </a:p>
+        </p:txBody>
+      </p:sp>
+      <p:sp>
+        <p:nvSpPr>
+          <p:cNvPr id="5" name="TextBox 4"/>
+          <p:cNvSpPr txBox="1"/>
+          <p:nvPr/>
+        </p:nvSpPr>
+        <p:spPr>
+          <a:xfrm>
+            <a:off x="2933700" y="205938"/>
+            <a:ext cx="3505200" cy="646331"/>
+          </a:xfrm>
+          <a:prstGeom prst="rect">
+            <a:avLst/>
+          </a:prstGeom>
+          <a:noFill/>
+        </p:spPr>
+        <p:txBody>
+          <a:bodyPr wrap="square" rtlCol="0">
+            <a:spAutoFit/>
+          </a:bodyPr>
+          <a:lstStyle/>
+          <a:p>
+            <a:pPr algn="ctr"/>
+            <a:r>
+              <a:rPr lang="en-US" sz="3600" dirty="0" smtClean="0"/>
+              <a:t>Server</a:t>
+            </a:r>
+            <a:endParaRPr lang="en-US" dirty="0"/>
+          </a:p>
+        </p:txBody>
+      </p:sp>
+      <p:sp>
+        <p:nvSpPr>
+          <p:cNvPr id="6" name="Snip Same Side Corner Rectangle 5"/>
+          <p:cNvSpPr/>
+          <p:nvPr/>
+        </p:nvSpPr>
+        <p:spPr>
+          <a:xfrm>
+            <a:off x="1524000" y="2159000"/>
+            <a:ext cx="2667000" cy="1981200"/>
+          </a:xfrm>
+          <a:prstGeom prst="snip2SameRect">
+            <a:avLst/>
+          </a:prstGeom>
+        </p:spPr>
+        <p:style>
+          <a:lnRef idx="2">
+            <a:schemeClr val="accent1">
+              <a:shade val="50000"/>
+            </a:schemeClr>
+          </a:lnRef>
+          <a:fillRef idx="1">
+            <a:schemeClr val="accent1"/>
+          </a:fillRef>
+          <a:effectRef idx="0">
+            <a:schemeClr val="accent1"/>
+          </a:effectRef>
+          <a:fontRef idx="minor">
+            <a:schemeClr val="lt1"/>
+          </a:fontRef>
+        </p:style>
+        <p:txBody>
+          <a:bodyPr rtlCol="0" anchor="ctr"/>
+          <a:lstStyle/>
+          <a:p>
+            <a:pPr algn="ctr"/>
+            <a:r>
+              <a:rPr lang="en-US" dirty="0" smtClean="0"/>
+              <a:t>Player Database</a:t>
+            </a:r>
+            <a:endParaRPr lang="en-US" dirty="0"/>
+          </a:p>
+        </p:txBody>
+      </p:sp>
+      <p:sp>
+        <p:nvSpPr>
+          <p:cNvPr id="7" name="Rectangle 6"/>
+          <p:cNvSpPr/>
+          <p:nvPr/>
+        </p:nvSpPr>
+        <p:spPr>
+          <a:xfrm>
+            <a:off x="5334000" y="1377950"/>
+            <a:ext cx="2578100" cy="3543300"/>
+          </a:xfrm>
+          <a:prstGeom prst="rect">
+            <a:avLst/>
+          </a:prstGeom>
+        </p:spPr>
+        <p:style>
+          <a:lnRef idx="2">
+            <a:schemeClr val="accent1">
+              <a:shade val="50000"/>
+            </a:schemeClr>
+          </a:lnRef>
+          <a:fillRef idx="1">
+            <a:schemeClr val="accent1"/>
+          </a:fillRef>
+          <a:effectRef idx="0">
+            <a:schemeClr val="accent1"/>
+          </a:effectRef>
+          <a:fontRef idx="minor">
+            <a:schemeClr val="lt1"/>
+          </a:fontRef>
+        </p:style>
+        <p:txBody>
+          <a:bodyPr rtlCol="0" anchor="ctr"/>
+          <a:lstStyle/>
+          <a:p>
+            <a:pPr algn="ctr"/>
+            <a:r>
+              <a:rPr lang="en-US" dirty="0" smtClean="0"/>
+              <a:t>Backend Server</a:t>
+            </a:r>
+            <a:endParaRPr lang="en-US" dirty="0"/>
+          </a:p>
+        </p:txBody>
+      </p:sp>
+      <p:cxnSp>
+        <p:nvCxnSpPr>
+          <p:cNvPr id="9" name="Straight Arrow Connector 8"/>
+          <p:cNvCxnSpPr/>
+          <p:nvPr/>
+        </p:nvCxnSpPr>
+        <p:spPr>
+          <a:xfrm flipH="1">
+            <a:off x="4191000" y="2971800"/>
+            <a:ext cx="1143000" cy="0"/>
+          </a:xfrm>
+          <a:prstGeom prst="straightConnector1">
+            <a:avLst/>
+          </a:prstGeom>
+          <a:ln>
+            <a:tailEnd type="arrow"/>
+          </a:ln>
+        </p:spPr>
+        <p:style>
+          <a:lnRef idx="1">
+            <a:schemeClr val="accent1"/>
+          </a:lnRef>
+          <a:fillRef idx="0">
+            <a:schemeClr val="accent1"/>
+          </a:fillRef>
+          <a:effectRef idx="0">
+            <a:schemeClr val="accent1"/>
+          </a:effectRef>
+          <a:fontRef idx="minor">
+            <a:schemeClr val="tx1"/>
+          </a:fontRef>
+        </p:style>
+      </p:cxnSp>
+      <p:cxnSp>
+        <p:nvCxnSpPr>
+          <p:cNvPr id="11" name="Straight Arrow Connector 10"/>
+          <p:cNvCxnSpPr/>
+          <p:nvPr/>
+        </p:nvCxnSpPr>
+        <p:spPr>
+          <a:xfrm>
+            <a:off x="4191000" y="3429000"/>
+            <a:ext cx="1143000" cy="0"/>
+          </a:xfrm>
+          <a:prstGeom prst="straightConnector1">
+            <a:avLst/>
+          </a:prstGeom>
+          <a:ln>
+            <a:tailEnd type="arrow"/>
+          </a:ln>
+        </p:spPr>
+        <p:style>
+          <a:lnRef idx="1">
+            <a:schemeClr val="accent1"/>
+          </a:lnRef>
+          <a:fillRef idx="0">
+            <a:schemeClr val="accent1"/>
+          </a:fillRef>
+          <a:effectRef idx="0">
+            <a:schemeClr val="accent1"/>
+          </a:effectRef>
+          <a:fontRef idx="minor">
+            <a:schemeClr val="tx1"/>
+          </a:fontRef>
+        </p:style>
+      </p:cxnSp>
+      <p:cxnSp>
+        <p:nvCxnSpPr>
+          <p:cNvPr id="13" name="Straight Arrow Connector 12"/>
+          <p:cNvCxnSpPr/>
+          <p:nvPr/>
+        </p:nvCxnSpPr>
+        <p:spPr>
+          <a:xfrm flipV="1">
+            <a:off x="6019800" y="685800"/>
+            <a:ext cx="0" cy="692151"/>
+          </a:xfrm>
+          <a:prstGeom prst="straightConnector1">
+            <a:avLst/>
+          </a:prstGeom>
+          <a:ln>
+            <a:tailEnd type="arrow"/>
+          </a:ln>
+        </p:spPr>
+        <p:style>
+          <a:lnRef idx="1">
+            <a:schemeClr val="accent1"/>
+          </a:lnRef>
+          <a:fillRef idx="0">
+            <a:schemeClr val="accent1"/>
+          </a:fillRef>
+          <a:effectRef idx="0">
+            <a:schemeClr val="accent1"/>
+          </a:effectRef>
+          <a:fontRef idx="minor">
+            <a:schemeClr val="tx1"/>
+          </a:fontRef>
+        </p:style>
+      </p:cxnSp>
+      <p:cxnSp>
+        <p:nvCxnSpPr>
+          <p:cNvPr id="15" name="Straight Arrow Connector 14"/>
+          <p:cNvCxnSpPr/>
+          <p:nvPr/>
+        </p:nvCxnSpPr>
+        <p:spPr>
+          <a:xfrm>
+            <a:off x="6172200" y="685800"/>
+            <a:ext cx="0" cy="692150"/>
+          </a:xfrm>
+          <a:prstGeom prst="straightConnector1">
+            <a:avLst/>
+          </a:prstGeom>
+          <a:ln>
+            <a:tailEnd type="arrow"/>
+          </a:ln>
+        </p:spPr>
+        <p:style>
+          <a:lnRef idx="1">
+            <a:schemeClr val="accent1"/>
+          </a:lnRef>
+          <a:fillRef idx="0">
+            <a:schemeClr val="accent1"/>
+          </a:fillRef>
+          <a:effectRef idx="0">
+            <a:schemeClr val="accent1"/>
+          </a:effectRef>
+          <a:fontRef idx="minor">
+            <a:schemeClr val="tx1"/>
+          </a:fontRef>
+        </p:style>
+      </p:cxnSp>
+      <p:cxnSp>
+        <p:nvCxnSpPr>
+          <p:cNvPr id="19" name="Straight Arrow Connector 18"/>
+          <p:cNvCxnSpPr/>
+          <p:nvPr/>
+        </p:nvCxnSpPr>
+        <p:spPr>
+          <a:xfrm flipV="1">
+            <a:off x="7239000" y="685799"/>
+            <a:ext cx="0" cy="692151"/>
+          </a:xfrm>
+          <a:prstGeom prst="straightConnector1">
+            <a:avLst/>
+          </a:prstGeom>
+          <a:ln>
+            <a:tailEnd type="arrow"/>
+          </a:ln>
+        </p:spPr>
+        <p:style>
+          <a:lnRef idx="1">
+            <a:schemeClr val="accent1"/>
+          </a:lnRef>
+          <a:fillRef idx="0">
+            <a:schemeClr val="accent1"/>
+          </a:fillRef>
+          <a:effectRef idx="0">
+            <a:schemeClr val="accent1"/>
+          </a:effectRef>
+          <a:fontRef idx="minor">
+            <a:schemeClr val="tx1"/>
+          </a:fontRef>
+        </p:style>
+      </p:cxnSp>
+      <p:cxnSp>
+        <p:nvCxnSpPr>
+          <p:cNvPr id="21" name="Straight Arrow Connector 20"/>
+          <p:cNvCxnSpPr/>
+          <p:nvPr/>
+        </p:nvCxnSpPr>
+        <p:spPr>
+          <a:xfrm>
+            <a:off x="7086600" y="685801"/>
+            <a:ext cx="0" cy="692150"/>
+          </a:xfrm>
+          <a:prstGeom prst="straightConnector1">
+            <a:avLst/>
+          </a:prstGeom>
+          <a:ln>
+            <a:tailEnd type="arrow"/>
+          </a:ln>
+        </p:spPr>
+        <p:style>
+          <a:lnRef idx="1">
+            <a:schemeClr val="accent1"/>
+          </a:lnRef>
+          <a:fillRef idx="0">
+            <a:schemeClr val="accent1"/>
+          </a:fillRef>
+          <a:effectRef idx="0">
+            <a:schemeClr val="accent1"/>
+          </a:effectRef>
+          <a:fontRef idx="minor">
+            <a:schemeClr val="tx1"/>
+          </a:fontRef>
+        </p:style>
+      </p:cxnSp>
+      <p:sp>
+        <p:nvSpPr>
+          <p:cNvPr id="22" name="TextBox 21"/>
+          <p:cNvSpPr txBox="1"/>
+          <p:nvPr/>
+        </p:nvSpPr>
+        <p:spPr>
+          <a:xfrm>
+            <a:off x="5867400" y="381000"/>
+            <a:ext cx="1524000" cy="369332"/>
+          </a:xfrm>
+          <a:prstGeom prst="rect">
+            <a:avLst/>
+          </a:prstGeom>
+          <a:noFill/>
+          <a:ln>
+            <a:solidFill>
+              <a:schemeClr val="tx1"/>
+            </a:solidFill>
+          </a:ln>
+        </p:spPr>
+        <p:txBody>
+          <a:bodyPr wrap="square" rtlCol="0">
+            <a:spAutoFit/>
+          </a:bodyPr>
+          <a:lstStyle/>
+          <a:p>
+            <a:pPr algn="ctr"/>
+            <a:r>
+              <a:rPr lang="en-US" dirty="0" smtClean="0"/>
+              <a:t>(to clients)</a:t>
+            </a:r>
+            <a:endParaRPr lang="en-US" dirty="0"/>
+          </a:p>
+        </p:txBody>
+      </p:sp>
+    </p:spTree>
+    <p:extLst>
+      <p:ext uri="{BB962C8B-B14F-4D97-AF65-F5344CB8AC3E}">
+        <p14:creationId xmlns:p14="http://schemas.microsoft.com/office/powerpoint/2010/main" val="1328176325"/>
       </p:ext>
     </p:extLst>
   </p:cSld>

</xml_diff>

<commit_message>
Work on design doc - still making updates
</commit_message>
<xml_diff>
--- a/Design Doc Figures.pptx
+++ b/Design Doc Figures.pptx
@@ -3989,8 +3989,8 @@
         </p:nvSpPr>
         <p:spPr>
           <a:xfrm>
-            <a:off x="1143000" y="838200"/>
-            <a:ext cx="7086600" cy="4876800"/>
+            <a:off x="838200" y="1272990"/>
+            <a:ext cx="7696200" cy="5334000"/>
           </a:xfrm>
           <a:prstGeom prst="rect">
             <a:avLst/>
@@ -4063,7 +4063,7 @@
         </p:nvSpPr>
         <p:spPr>
           <a:xfrm>
-            <a:off x="1504950" y="1828800"/>
+            <a:off x="1479550" y="2796990"/>
             <a:ext cx="2857500" cy="3581400"/>
           </a:xfrm>
           <a:prstGeom prst="rect">
@@ -4103,7 +4103,7 @@
         </p:nvSpPr>
         <p:spPr>
           <a:xfrm>
-            <a:off x="5010150" y="1828800"/>
+            <a:off x="4984750" y="2796990"/>
             <a:ext cx="2857500" cy="3581400"/>
           </a:xfrm>
           <a:prstGeom prst="rect">
@@ -4143,7 +4143,7 @@
         </p:nvCxnSpPr>
         <p:spPr>
           <a:xfrm>
-            <a:off x="1504950" y="2971800"/>
+            <a:off x="1479550" y="3939990"/>
             <a:ext cx="2857500" cy="0"/>
           </a:xfrm>
           <a:prstGeom prst="line">
@@ -4178,7 +4178,7 @@
         </p:nvCxnSpPr>
         <p:spPr>
           <a:xfrm>
-            <a:off x="1504950" y="4114800"/>
+            <a:off x="1479550" y="5082990"/>
             <a:ext cx="2857500" cy="0"/>
           </a:xfrm>
           <a:prstGeom prst="line">
@@ -4213,7 +4213,7 @@
         </p:nvSpPr>
         <p:spPr>
           <a:xfrm>
-            <a:off x="1504950" y="1066800"/>
+            <a:off x="1479550" y="2295687"/>
             <a:ext cx="2857500" cy="461665"/>
           </a:xfrm>
           <a:prstGeom prst="rect">
@@ -4230,7 +4230,11 @@
             <a:pPr algn="ctr"/>
             <a:r>
               <a:rPr lang="en-US" sz="2400" dirty="0" smtClean="0"/>
-              <a:t>Screen Manager</a:t>
+              <a:t>Menu</a:t>
+            </a:r>
+            <a:r>
+              <a:rPr lang="en-US" sz="2400" dirty="0" smtClean="0"/>
+              <a:t> Manager</a:t>
             </a:r>
             <a:endParaRPr lang="en-US" sz="2400" dirty="0"/>
           </a:p>
@@ -4244,7 +4248,7 @@
         </p:nvSpPr>
         <p:spPr>
           <a:xfrm>
-            <a:off x="5010150" y="1066800"/>
+            <a:off x="4991100" y="2295687"/>
             <a:ext cx="2857500" cy="461665"/>
           </a:xfrm>
           <a:prstGeom prst="rect">
@@ -4275,7 +4279,7 @@
         </p:nvSpPr>
         <p:spPr>
           <a:xfrm>
-            <a:off x="1752600" y="2190690"/>
+            <a:off x="1727200" y="3158880"/>
             <a:ext cx="2438400" cy="400110"/>
           </a:xfrm>
           <a:prstGeom prst="rect">
@@ -4306,7 +4310,7 @@
         </p:nvSpPr>
         <p:spPr>
           <a:xfrm>
-            <a:off x="1752600" y="3315276"/>
+            <a:off x="1727200" y="4283466"/>
             <a:ext cx="2438400" cy="400110"/>
           </a:xfrm>
           <a:prstGeom prst="rect">
@@ -4345,7 +4349,7 @@
         </p:nvSpPr>
         <p:spPr>
           <a:xfrm>
-            <a:off x="1752600" y="4495800"/>
+            <a:off x="1727200" y="5463990"/>
             <a:ext cx="2438400" cy="400110"/>
           </a:xfrm>
           <a:prstGeom prst="rect">
@@ -4376,7 +4380,7 @@
         </p:nvSpPr>
         <p:spPr>
           <a:xfrm>
-            <a:off x="5410200" y="2584390"/>
+            <a:off x="5384800" y="3552580"/>
             <a:ext cx="2057400" cy="704910"/>
           </a:xfrm>
           <a:prstGeom prst="rect">
@@ -4421,7 +4425,7 @@
         </p:nvSpPr>
         <p:spPr>
           <a:xfrm>
-            <a:off x="5537200" y="2037258"/>
+            <a:off x="5511800" y="3005448"/>
             <a:ext cx="1752600" cy="369332"/>
           </a:xfrm>
           <a:prstGeom prst="rect">
@@ -4452,7 +4456,7 @@
         </p:nvCxnSpPr>
         <p:spPr>
           <a:xfrm>
-            <a:off x="5562600" y="2584390"/>
+            <a:off x="5537200" y="3552580"/>
             <a:ext cx="0" cy="692210"/>
           </a:xfrm>
           <a:prstGeom prst="line">
@@ -4487,7 +4491,7 @@
         </p:nvCxnSpPr>
         <p:spPr>
           <a:xfrm>
-            <a:off x="5727700" y="2584390"/>
+            <a:off x="5702300" y="3552580"/>
             <a:ext cx="0" cy="692210"/>
           </a:xfrm>
           <a:prstGeom prst="line">
@@ -4522,7 +4526,7 @@
         </p:nvCxnSpPr>
         <p:spPr>
           <a:xfrm>
-            <a:off x="5880100" y="2555785"/>
+            <a:off x="5854700" y="3523975"/>
             <a:ext cx="0" cy="692210"/>
           </a:xfrm>
           <a:prstGeom prst="line">
@@ -4557,7 +4561,7 @@
         </p:nvCxnSpPr>
         <p:spPr>
           <a:xfrm>
-            <a:off x="6032500" y="2597090"/>
+            <a:off x="6007100" y="3565280"/>
             <a:ext cx="0" cy="692210"/>
           </a:xfrm>
           <a:prstGeom prst="line">
@@ -4592,7 +4596,7 @@
         </p:nvCxnSpPr>
         <p:spPr>
           <a:xfrm>
-            <a:off x="6184900" y="2584390"/>
+            <a:off x="6159500" y="3552580"/>
             <a:ext cx="0" cy="692210"/>
           </a:xfrm>
           <a:prstGeom prst="line">
@@ -4627,7 +4631,7 @@
         </p:nvCxnSpPr>
         <p:spPr>
           <a:xfrm>
-            <a:off x="6337300" y="2555785"/>
+            <a:off x="6311900" y="3523975"/>
             <a:ext cx="0" cy="692210"/>
           </a:xfrm>
           <a:prstGeom prst="line">
@@ -4662,7 +4666,7 @@
         </p:nvCxnSpPr>
         <p:spPr>
           <a:xfrm>
-            <a:off x="6489700" y="2584390"/>
+            <a:off x="6464300" y="3552580"/>
             <a:ext cx="0" cy="692210"/>
           </a:xfrm>
           <a:prstGeom prst="line">
@@ -4697,7 +4701,7 @@
         </p:nvCxnSpPr>
         <p:spPr>
           <a:xfrm>
-            <a:off x="6642100" y="2555785"/>
+            <a:off x="6616700" y="3523975"/>
             <a:ext cx="0" cy="692210"/>
           </a:xfrm>
           <a:prstGeom prst="line">
@@ -4732,7 +4736,7 @@
         </p:nvCxnSpPr>
         <p:spPr>
           <a:xfrm>
-            <a:off x="6794500" y="2565280"/>
+            <a:off x="6769100" y="3533470"/>
             <a:ext cx="0" cy="692210"/>
           </a:xfrm>
           <a:prstGeom prst="line">
@@ -4767,7 +4771,7 @@
         </p:nvCxnSpPr>
         <p:spPr>
           <a:xfrm>
-            <a:off x="6946900" y="2584390"/>
+            <a:off x="6921500" y="3552580"/>
             <a:ext cx="0" cy="692210"/>
           </a:xfrm>
           <a:prstGeom prst="line">
@@ -4802,7 +4806,7 @@
         </p:nvCxnSpPr>
         <p:spPr>
           <a:xfrm>
-            <a:off x="7099300" y="2597090"/>
+            <a:off x="7073900" y="3565280"/>
             <a:ext cx="0" cy="692210"/>
           </a:xfrm>
           <a:prstGeom prst="line">
@@ -4837,7 +4841,7 @@
         </p:nvCxnSpPr>
         <p:spPr>
           <a:xfrm>
-            <a:off x="7251700" y="2565280"/>
+            <a:off x="7226300" y="3533470"/>
             <a:ext cx="0" cy="692210"/>
           </a:xfrm>
           <a:prstGeom prst="line">
@@ -4872,7 +4876,7 @@
         </p:nvSpPr>
         <p:spPr>
           <a:xfrm>
-            <a:off x="5727700" y="3803590"/>
+            <a:off x="5702300" y="4771780"/>
             <a:ext cx="1371600" cy="704910"/>
           </a:xfrm>
           <a:prstGeom prst="rect">
@@ -4917,7 +4921,7 @@
         </p:nvSpPr>
         <p:spPr>
           <a:xfrm>
-            <a:off x="5880100" y="4495800"/>
+            <a:off x="5854700" y="5463990"/>
             <a:ext cx="1066800" cy="369332"/>
           </a:xfrm>
           <a:prstGeom prst="rect">
@@ -4948,7 +4952,7 @@
         </p:nvCxnSpPr>
         <p:spPr>
           <a:xfrm>
-            <a:off x="5880100" y="3816290"/>
+            <a:off x="5854700" y="4784480"/>
             <a:ext cx="0" cy="692210"/>
           </a:xfrm>
           <a:prstGeom prst="line">
@@ -4983,7 +4987,7 @@
         </p:nvCxnSpPr>
         <p:spPr>
           <a:xfrm>
-            <a:off x="6032500" y="3794035"/>
+            <a:off x="6007100" y="4762225"/>
             <a:ext cx="0" cy="692210"/>
           </a:xfrm>
           <a:prstGeom prst="line">
@@ -5018,7 +5022,7 @@
         </p:nvCxnSpPr>
         <p:spPr>
           <a:xfrm>
-            <a:off x="6184900" y="3781275"/>
+            <a:off x="6159500" y="4749465"/>
             <a:ext cx="0" cy="692210"/>
           </a:xfrm>
           <a:prstGeom prst="line">
@@ -5053,7 +5057,7 @@
         </p:nvCxnSpPr>
         <p:spPr>
           <a:xfrm>
-            <a:off x="6337300" y="3803590"/>
+            <a:off x="6311900" y="4771780"/>
             <a:ext cx="0" cy="692210"/>
           </a:xfrm>
           <a:prstGeom prst="line">
@@ -5088,7 +5092,7 @@
         </p:nvCxnSpPr>
         <p:spPr>
           <a:xfrm>
-            <a:off x="6489700" y="3816290"/>
+            <a:off x="6464300" y="4784480"/>
             <a:ext cx="0" cy="692210"/>
           </a:xfrm>
           <a:prstGeom prst="line">
@@ -5123,7 +5127,7 @@
         </p:nvCxnSpPr>
         <p:spPr>
           <a:xfrm>
-            <a:off x="6642100" y="3790830"/>
+            <a:off x="6616700" y="4759020"/>
             <a:ext cx="0" cy="692210"/>
           </a:xfrm>
           <a:prstGeom prst="line">
@@ -5158,7 +5162,7 @@
         </p:nvCxnSpPr>
         <p:spPr>
           <a:xfrm>
-            <a:off x="6794500" y="3803590"/>
+            <a:off x="6769100" y="4771780"/>
             <a:ext cx="0" cy="692210"/>
           </a:xfrm>
           <a:prstGeom prst="line">
@@ -5193,7 +5197,7 @@
         </p:nvCxnSpPr>
         <p:spPr>
           <a:xfrm>
-            <a:off x="6946900" y="3819255"/>
+            <a:off x="6921500" y="4787445"/>
             <a:ext cx="0" cy="692210"/>
           </a:xfrm>
           <a:prstGeom prst="line">
@@ -5230,7 +5234,7 @@
         </p:nvCxnSpPr>
         <p:spPr>
           <a:xfrm>
-            <a:off x="5410200" y="3276600"/>
+            <a:off x="5384800" y="4244790"/>
             <a:ext cx="1003300" cy="526990"/>
           </a:xfrm>
           <a:prstGeom prst="straightConnector1">
@@ -5266,7 +5270,7 @@
         </p:nvCxnSpPr>
         <p:spPr>
           <a:xfrm>
-            <a:off x="5880100" y="3257490"/>
+            <a:off x="5854700" y="4225680"/>
             <a:ext cx="69850" cy="523785"/>
           </a:xfrm>
           <a:prstGeom prst="straightConnector1">
@@ -5302,7 +5306,7 @@
         </p:nvCxnSpPr>
         <p:spPr>
           <a:xfrm>
-            <a:off x="5949950" y="3289300"/>
+            <a:off x="5924550" y="4257490"/>
             <a:ext cx="117475" cy="491975"/>
           </a:xfrm>
           <a:prstGeom prst="straightConnector1">
@@ -5338,7 +5342,7 @@
         </p:nvCxnSpPr>
         <p:spPr>
           <a:xfrm>
-            <a:off x="6067425" y="3289300"/>
+            <a:off x="6042025" y="4257490"/>
             <a:ext cx="942975" cy="504735"/>
           </a:xfrm>
           <a:prstGeom prst="straightConnector1">
@@ -5374,7 +5378,7 @@
         </p:nvCxnSpPr>
         <p:spPr>
           <a:xfrm flipH="1">
-            <a:off x="5791200" y="3276600"/>
+            <a:off x="5765800" y="4244790"/>
             <a:ext cx="457200" cy="504675"/>
           </a:xfrm>
           <a:prstGeom prst="straightConnector1">
@@ -5410,7 +5414,7 @@
         </p:nvCxnSpPr>
         <p:spPr>
           <a:xfrm flipH="1">
-            <a:off x="6248400" y="3276600"/>
+            <a:off x="6223000" y="4244790"/>
             <a:ext cx="393700" cy="504675"/>
           </a:xfrm>
           <a:prstGeom prst="straightConnector1">
@@ -5446,7 +5450,7 @@
         </p:nvCxnSpPr>
         <p:spPr>
           <a:xfrm flipH="1">
-            <a:off x="6507162" y="3289300"/>
+            <a:off x="6481762" y="4257490"/>
             <a:ext cx="198438" cy="504735"/>
           </a:xfrm>
           <a:prstGeom prst="straightConnector1">
@@ -5482,7 +5486,7 @@
         </p:nvCxnSpPr>
         <p:spPr>
           <a:xfrm flipH="1">
-            <a:off x="6705600" y="3289300"/>
+            <a:off x="6680200" y="4257490"/>
             <a:ext cx="609600" cy="504735"/>
           </a:xfrm>
           <a:prstGeom prst="straightConnector1">
@@ -5518,7 +5522,7 @@
         </p:nvCxnSpPr>
         <p:spPr>
           <a:xfrm>
-            <a:off x="6858000" y="3276600"/>
+            <a:off x="6832600" y="4244790"/>
             <a:ext cx="0" cy="539690"/>
           </a:xfrm>
           <a:prstGeom prst="straightConnector1">
@@ -5554,7 +5558,7 @@
         </p:nvSpPr>
         <p:spPr>
           <a:xfrm>
-            <a:off x="5257800" y="4895910"/>
+            <a:off x="5232400" y="5864100"/>
             <a:ext cx="2362200" cy="261610"/>
           </a:xfrm>
           <a:prstGeom prst="rect">
@@ -5584,6 +5588,120 @@
           </a:p>
         </p:txBody>
       </p:sp>
+      <p:sp>
+        <p:nvSpPr>
+          <p:cNvPr id="69" name="Snip Same Side Corner Rectangle 68"/>
+          <p:cNvSpPr/>
+          <p:nvPr/>
+        </p:nvSpPr>
+        <p:spPr>
+          <a:xfrm>
+            <a:off x="3289300" y="1381286"/>
+            <a:ext cx="2794000" cy="771687"/>
+          </a:xfrm>
+          <a:prstGeom prst="snip2SameRect">
+            <a:avLst/>
+          </a:prstGeom>
+        </p:spPr>
+        <p:style>
+          <a:lnRef idx="2">
+            <a:schemeClr val="accent1">
+              <a:shade val="50000"/>
+            </a:schemeClr>
+          </a:lnRef>
+          <a:fillRef idx="1">
+            <a:schemeClr val="accent1"/>
+          </a:fillRef>
+          <a:effectRef idx="0">
+            <a:schemeClr val="accent1"/>
+          </a:effectRef>
+          <a:fontRef idx="minor">
+            <a:schemeClr val="lt1"/>
+          </a:fontRef>
+        </p:style>
+        <p:txBody>
+          <a:bodyPr rtlCol="0" anchor="ctr"/>
+          <a:lstStyle/>
+          <a:p>
+            <a:pPr algn="ctr"/>
+            <a:r>
+              <a:rPr lang="en-US" sz="2800" dirty="0" smtClean="0"/>
+              <a:t>Screen Manager</a:t>
+            </a:r>
+            <a:endParaRPr lang="en-US" sz="2800" dirty="0"/>
+          </a:p>
+        </p:txBody>
+      </p:sp>
+      <p:cxnSp>
+        <p:nvCxnSpPr>
+          <p:cNvPr id="71" name="Straight Arrow Connector 70"/>
+          <p:cNvCxnSpPr>
+            <a:stCxn id="69" idx="1"/>
+          </p:cNvCxnSpPr>
+          <p:nvPr/>
+        </p:nvCxnSpPr>
+        <p:spPr>
+          <a:xfrm>
+            <a:off x="4686300" y="2152973"/>
+            <a:ext cx="723900" cy="285427"/>
+          </a:xfrm>
+          <a:prstGeom prst="straightConnector1">
+            <a:avLst/>
+          </a:prstGeom>
+          <a:ln>
+            <a:tailEnd type="arrow"/>
+          </a:ln>
+        </p:spPr>
+        <p:style>
+          <a:lnRef idx="1">
+            <a:schemeClr val="accent1"/>
+          </a:lnRef>
+          <a:fillRef idx="0">
+            <a:schemeClr val="accent1"/>
+          </a:fillRef>
+          <a:effectRef idx="0">
+            <a:schemeClr val="accent1"/>
+          </a:effectRef>
+          <a:fontRef idx="minor">
+            <a:schemeClr val="tx1"/>
+          </a:fontRef>
+        </p:style>
+      </p:cxnSp>
+      <p:cxnSp>
+        <p:nvCxnSpPr>
+          <p:cNvPr id="73" name="Straight Arrow Connector 72"/>
+          <p:cNvCxnSpPr>
+            <a:stCxn id="69" idx="1"/>
+          </p:cNvCxnSpPr>
+          <p:nvPr/>
+        </p:nvCxnSpPr>
+        <p:spPr>
+          <a:xfrm flipH="1">
+            <a:off x="3886200" y="2152973"/>
+            <a:ext cx="800100" cy="285427"/>
+          </a:xfrm>
+          <a:prstGeom prst="straightConnector1">
+            <a:avLst/>
+          </a:prstGeom>
+          <a:ln>
+            <a:tailEnd type="arrow"/>
+          </a:ln>
+        </p:spPr>
+        <p:style>
+          <a:lnRef idx="1">
+            <a:schemeClr val="accent1"/>
+          </a:lnRef>
+          <a:fillRef idx="0">
+            <a:schemeClr val="accent1"/>
+          </a:fillRef>
+          <a:effectRef idx="0">
+            <a:schemeClr val="accent1"/>
+          </a:effectRef>
+          <a:fontRef idx="minor">
+            <a:schemeClr val="tx1"/>
+          </a:fontRef>
+        </p:style>
+      </p:cxnSp>
     </p:spTree>
     <p:extLst>
       <p:ext uri="{BB962C8B-B14F-4D97-AF65-F5344CB8AC3E}">

</xml_diff>

<commit_message>
A lot more work on the design doc. It should be just about finished.
</commit_message>
<xml_diff>
--- a/Design Doc Figures.pptx
+++ b/Design Doc Figures.pptx
@@ -5,12 +5,14 @@
     <p:sldMasterId id="2147483648" r:id="rId1"/>
   </p:sldMasterIdLst>
   <p:notesMasterIdLst>
-    <p:notesMasterId r:id="rId5"/>
+    <p:notesMasterId r:id="rId7"/>
   </p:notesMasterIdLst>
   <p:sldIdLst>
     <p:sldId id="256" r:id="rId2"/>
     <p:sldId id="257" r:id="rId3"/>
     <p:sldId id="258" r:id="rId4"/>
+    <p:sldId id="259" r:id="rId5"/>
+    <p:sldId id="260" r:id="rId6"/>
   </p:sldIdLst>
   <p:sldSz cx="9144000" cy="6858000" type="screen4x3"/>
   <p:notesSz cx="6858000" cy="9144000"/>
@@ -109,6 +111,22 @@
       </a:defRPr>
     </a:lvl9pPr>
   </p:defaultTextStyle>
+  <p:extLst>
+    <p:ext uri="{EFAFB233-063F-42B5-8137-9DF3F51BA10A}">
+      <p15:sldGuideLst xmlns:p15="http://schemas.microsoft.com/office/powerpoint/2012/main">
+        <p15:guide id="1" orient="horz" pos="2160">
+          <p15:clr>
+            <a:srgbClr val="A4A3A4"/>
+          </p15:clr>
+        </p15:guide>
+        <p15:guide id="2" pos="2880">
+          <p15:clr>
+            <a:srgbClr val="A4A3A4"/>
+          </p15:clr>
+        </p15:guide>
+      </p15:sldGuideLst>
+    </p:ext>
+  </p:extLst>
 </p:presentation>
 </file>
 
@@ -194,7 +212,7 @@
           <a:p>
             <a:fld id="{BAB10C68-15E3-49D5-A8A7-92C24BD58E90}" type="datetimeFigureOut">
               <a:rPr lang="en-US" smtClean="0"/>
-              <a:t>3/19/2014</a:t>
+              <a:t>3/21/2014</a:t>
             </a:fld>
             <a:endParaRPr lang="en-US"/>
           </a:p>
@@ -895,7 +913,7 @@
           <a:p>
             <a:fld id="{027BFF9F-D931-476A-B492-D9C71732684E}" type="datetimeFigureOut">
               <a:rPr lang="en-US" smtClean="0"/>
-              <a:t>3/19/2014</a:t>
+              <a:t>3/21/2014</a:t>
             </a:fld>
             <a:endParaRPr lang="en-US"/>
           </a:p>
@@ -1065,7 +1083,7 @@
           <a:p>
             <a:fld id="{027BFF9F-D931-476A-B492-D9C71732684E}" type="datetimeFigureOut">
               <a:rPr lang="en-US" smtClean="0"/>
-              <a:t>3/19/2014</a:t>
+              <a:t>3/21/2014</a:t>
             </a:fld>
             <a:endParaRPr lang="en-US"/>
           </a:p>
@@ -1245,7 +1263,7 @@
           <a:p>
             <a:fld id="{027BFF9F-D931-476A-B492-D9C71732684E}" type="datetimeFigureOut">
               <a:rPr lang="en-US" smtClean="0"/>
-              <a:t>3/19/2014</a:t>
+              <a:t>3/21/2014</a:t>
             </a:fld>
             <a:endParaRPr lang="en-US"/>
           </a:p>
@@ -1415,7 +1433,7 @@
           <a:p>
             <a:fld id="{027BFF9F-D931-476A-B492-D9C71732684E}" type="datetimeFigureOut">
               <a:rPr lang="en-US" smtClean="0"/>
-              <a:t>3/19/2014</a:t>
+              <a:t>3/21/2014</a:t>
             </a:fld>
             <a:endParaRPr lang="en-US"/>
           </a:p>
@@ -1661,7 +1679,7 @@
           <a:p>
             <a:fld id="{027BFF9F-D931-476A-B492-D9C71732684E}" type="datetimeFigureOut">
               <a:rPr lang="en-US" smtClean="0"/>
-              <a:t>3/19/2014</a:t>
+              <a:t>3/21/2014</a:t>
             </a:fld>
             <a:endParaRPr lang="en-US"/>
           </a:p>
@@ -1949,7 +1967,7 @@
           <a:p>
             <a:fld id="{027BFF9F-D931-476A-B492-D9C71732684E}" type="datetimeFigureOut">
               <a:rPr lang="en-US" smtClean="0"/>
-              <a:t>3/19/2014</a:t>
+              <a:t>3/21/2014</a:t>
             </a:fld>
             <a:endParaRPr lang="en-US"/>
           </a:p>
@@ -2371,7 +2389,7 @@
           <a:p>
             <a:fld id="{027BFF9F-D931-476A-B492-D9C71732684E}" type="datetimeFigureOut">
               <a:rPr lang="en-US" smtClean="0"/>
-              <a:t>3/19/2014</a:t>
+              <a:t>3/21/2014</a:t>
             </a:fld>
             <a:endParaRPr lang="en-US"/>
           </a:p>
@@ -2489,7 +2507,7 @@
           <a:p>
             <a:fld id="{027BFF9F-D931-476A-B492-D9C71732684E}" type="datetimeFigureOut">
               <a:rPr lang="en-US" smtClean="0"/>
-              <a:t>3/19/2014</a:t>
+              <a:t>3/21/2014</a:t>
             </a:fld>
             <a:endParaRPr lang="en-US"/>
           </a:p>
@@ -2584,7 +2602,7 @@
           <a:p>
             <a:fld id="{027BFF9F-D931-476A-B492-D9C71732684E}" type="datetimeFigureOut">
               <a:rPr lang="en-US" smtClean="0"/>
-              <a:t>3/19/2014</a:t>
+              <a:t>3/21/2014</a:t>
             </a:fld>
             <a:endParaRPr lang="en-US"/>
           </a:p>
@@ -2861,7 +2879,7 @@
           <a:p>
             <a:fld id="{027BFF9F-D931-476A-B492-D9C71732684E}" type="datetimeFigureOut">
               <a:rPr lang="en-US" smtClean="0"/>
-              <a:t>3/19/2014</a:t>
+              <a:t>3/21/2014</a:t>
             </a:fld>
             <a:endParaRPr lang="en-US"/>
           </a:p>
@@ -3114,7 +3132,7 @@
           <a:p>
             <a:fld id="{027BFF9F-D931-476A-B492-D9C71732684E}" type="datetimeFigureOut">
               <a:rPr lang="en-US" smtClean="0"/>
-              <a:t>3/19/2014</a:t>
+              <a:t>3/21/2014</a:t>
             </a:fld>
             <a:endParaRPr lang="en-US"/>
           </a:p>
@@ -3327,7 +3345,7 @@
           <a:p>
             <a:fld id="{027BFF9F-D931-476A-B492-D9C71732684E}" type="datetimeFigureOut">
               <a:rPr lang="en-US" smtClean="0"/>
-              <a:t>3/19/2014</a:t>
+              <a:t>3/21/2014</a:t>
             </a:fld>
             <a:endParaRPr lang="en-US"/>
           </a:p>
@@ -4230,11 +4248,7 @@
             <a:pPr algn="ctr"/>
             <a:r>
               <a:rPr lang="en-US" sz="2400" dirty="0" smtClean="0"/>
-              <a:t>Menu</a:t>
-            </a:r>
-            <a:r>
-              <a:rPr lang="en-US" sz="2400" dirty="0" smtClean="0"/>
-              <a:t> Manager</a:t>
+              <a:t>Menu Manager</a:t>
             </a:r>
             <a:endParaRPr lang="en-US" sz="2400" dirty="0"/>
           </a:p>
@@ -6132,6 +6146,647 @@
     <p:extLst>
       <p:ext uri="{BB962C8B-B14F-4D97-AF65-F5344CB8AC3E}">
         <p14:creationId xmlns:p14="http://schemas.microsoft.com/office/powerpoint/2010/main" val="1328176325"/>
+      </p:ext>
+    </p:extLst>
+  </p:cSld>
+  <p:clrMapOvr>
+    <a:masterClrMapping/>
+  </p:clrMapOvr>
+</p:sld>
+</file>
+
+<file path=ppt/slides/slide4.xml><?xml version="1.0" encoding="utf-8"?>
+<p:sld xmlns:a="http://schemas.openxmlformats.org/drawingml/2006/main" xmlns:r="http://schemas.openxmlformats.org/officeDocument/2006/relationships" xmlns:p="http://schemas.openxmlformats.org/presentationml/2006/main">
+  <p:cSld>
+    <p:spTree>
+      <p:nvGrpSpPr>
+        <p:cNvPr id="1" name=""/>
+        <p:cNvGrpSpPr/>
+        <p:nvPr/>
+      </p:nvGrpSpPr>
+      <p:grpSpPr>
+        <a:xfrm>
+          <a:off x="0" y="0"/>
+          <a:ext cx="0" cy="0"/>
+          <a:chOff x="0" y="0"/>
+          <a:chExt cx="0" cy="0"/>
+        </a:xfrm>
+      </p:grpSpPr>
+      <p:sp>
+        <p:nvSpPr>
+          <p:cNvPr id="2" name="Rectangle 1"/>
+          <p:cNvSpPr/>
+          <p:nvPr/>
+        </p:nvSpPr>
+        <p:spPr>
+          <a:xfrm>
+            <a:off x="1143000" y="1295400"/>
+            <a:ext cx="3733800" cy="1905000"/>
+          </a:xfrm>
+          <a:prstGeom prst="rect">
+            <a:avLst/>
+          </a:prstGeom>
+        </p:spPr>
+        <p:style>
+          <a:lnRef idx="2">
+            <a:schemeClr val="accent1">
+              <a:shade val="50000"/>
+            </a:schemeClr>
+          </a:lnRef>
+          <a:fillRef idx="1">
+            <a:schemeClr val="accent1"/>
+          </a:fillRef>
+          <a:effectRef idx="0">
+            <a:schemeClr val="accent1"/>
+          </a:effectRef>
+          <a:fontRef idx="minor">
+            <a:schemeClr val="lt1"/>
+          </a:fontRef>
+        </p:style>
+        <p:txBody>
+          <a:bodyPr rtlCol="0" anchor="ctr"/>
+          <a:lstStyle/>
+          <a:p>
+            <a:pPr algn="ctr"/>
+            <a:endParaRPr lang="en-US"/>
+          </a:p>
+        </p:txBody>
+      </p:sp>
+      <p:cxnSp>
+        <p:nvCxnSpPr>
+          <p:cNvPr id="4" name="Straight Connector 3"/>
+          <p:cNvCxnSpPr/>
+          <p:nvPr/>
+        </p:nvCxnSpPr>
+        <p:spPr>
+          <a:xfrm>
+            <a:off x="2286000" y="1295400"/>
+            <a:ext cx="0" cy="1905000"/>
+          </a:xfrm>
+          <a:prstGeom prst="line">
+            <a:avLst/>
+          </a:prstGeom>
+        </p:spPr>
+        <p:style>
+          <a:lnRef idx="2">
+            <a:schemeClr val="dk1"/>
+          </a:lnRef>
+          <a:fillRef idx="0">
+            <a:schemeClr val="dk1"/>
+          </a:fillRef>
+          <a:effectRef idx="1">
+            <a:schemeClr val="dk1"/>
+          </a:effectRef>
+          <a:fontRef idx="minor">
+            <a:schemeClr val="tx1"/>
+          </a:fontRef>
+        </p:style>
+      </p:cxnSp>
+      <p:cxnSp>
+        <p:nvCxnSpPr>
+          <p:cNvPr id="6" name="Straight Connector 5"/>
+          <p:cNvCxnSpPr/>
+          <p:nvPr/>
+        </p:nvCxnSpPr>
+        <p:spPr>
+          <a:xfrm>
+            <a:off x="3657600" y="1295400"/>
+            <a:ext cx="0" cy="1905000"/>
+          </a:xfrm>
+          <a:prstGeom prst="line">
+            <a:avLst/>
+          </a:prstGeom>
+        </p:spPr>
+        <p:style>
+          <a:lnRef idx="2">
+            <a:schemeClr val="dk1"/>
+          </a:lnRef>
+          <a:fillRef idx="0">
+            <a:schemeClr val="dk1"/>
+          </a:fillRef>
+          <a:effectRef idx="1">
+            <a:schemeClr val="dk1"/>
+          </a:effectRef>
+          <a:fontRef idx="minor">
+            <a:schemeClr val="tx1"/>
+          </a:fontRef>
+        </p:style>
+      </p:cxnSp>
+      <p:sp>
+        <p:nvSpPr>
+          <p:cNvPr id="16" name="TextBox 15"/>
+          <p:cNvSpPr txBox="1"/>
+          <p:nvPr/>
+        </p:nvSpPr>
+        <p:spPr>
+          <a:xfrm>
+            <a:off x="1160417" y="1924734"/>
+            <a:ext cx="990600" cy="646331"/>
+          </a:xfrm>
+          <a:prstGeom prst="rect">
+            <a:avLst/>
+          </a:prstGeom>
+          <a:noFill/>
+        </p:spPr>
+        <p:txBody>
+          <a:bodyPr wrap="square" rtlCol="0">
+            <a:spAutoFit/>
+          </a:bodyPr>
+          <a:lstStyle/>
+          <a:p>
+            <a:pPr algn="ctr"/>
+            <a:r>
+              <a:rPr lang="en-US" dirty="0" smtClean="0"/>
+              <a:t>Current Level</a:t>
+            </a:r>
+            <a:endParaRPr lang="en-US" dirty="0"/>
+          </a:p>
+        </p:txBody>
+      </p:sp>
+      <p:sp>
+        <p:nvSpPr>
+          <p:cNvPr id="21" name="TextBox 20"/>
+          <p:cNvSpPr txBox="1"/>
+          <p:nvPr/>
+        </p:nvSpPr>
+        <p:spPr>
+          <a:xfrm>
+            <a:off x="2455816" y="1922557"/>
+            <a:ext cx="1066800" cy="646331"/>
+          </a:xfrm>
+          <a:prstGeom prst="rect">
+            <a:avLst/>
+          </a:prstGeom>
+          <a:noFill/>
+        </p:spPr>
+        <p:txBody>
+          <a:bodyPr wrap="square" rtlCol="0">
+            <a:spAutoFit/>
+          </a:bodyPr>
+          <a:lstStyle/>
+          <a:p>
+            <a:pPr algn="ctr"/>
+            <a:r>
+              <a:rPr lang="en-US" dirty="0" smtClean="0"/>
+              <a:t>Next Level</a:t>
+            </a:r>
+            <a:endParaRPr lang="en-US" dirty="0"/>
+          </a:p>
+        </p:txBody>
+      </p:sp>
+      <p:sp>
+        <p:nvSpPr>
+          <p:cNvPr id="22" name="TextBox 21"/>
+          <p:cNvSpPr txBox="1"/>
+          <p:nvPr/>
+        </p:nvSpPr>
+        <p:spPr>
+          <a:xfrm>
+            <a:off x="3810000" y="1784057"/>
+            <a:ext cx="914400" cy="923330"/>
+          </a:xfrm>
+          <a:prstGeom prst="rect">
+            <a:avLst/>
+          </a:prstGeom>
+          <a:noFill/>
+        </p:spPr>
+        <p:txBody>
+          <a:bodyPr wrap="square" rtlCol="0">
+            <a:spAutoFit/>
+          </a:bodyPr>
+          <a:lstStyle/>
+          <a:p>
+            <a:pPr algn="ctr"/>
+            <a:r>
+              <a:rPr lang="en-US" dirty="0" smtClean="0"/>
+              <a:t>Two Levels Ahead</a:t>
+            </a:r>
+            <a:endParaRPr lang="en-US" dirty="0"/>
+          </a:p>
+        </p:txBody>
+      </p:sp>
+      <p:sp>
+        <p:nvSpPr>
+          <p:cNvPr id="23" name="TextBox 22"/>
+          <p:cNvSpPr txBox="1"/>
+          <p:nvPr/>
+        </p:nvSpPr>
+        <p:spPr>
+          <a:xfrm>
+            <a:off x="1143000" y="762000"/>
+            <a:ext cx="3733800" cy="369332"/>
+          </a:xfrm>
+          <a:prstGeom prst="rect">
+            <a:avLst/>
+          </a:prstGeom>
+          <a:noFill/>
+        </p:spPr>
+        <p:txBody>
+          <a:bodyPr wrap="square" rtlCol="0">
+            <a:spAutoFit/>
+          </a:bodyPr>
+          <a:lstStyle/>
+          <a:p>
+            <a:pPr algn="ctr"/>
+            <a:r>
+              <a:rPr lang="en-US" dirty="0" smtClean="0"/>
+              <a:t>The Level Buffer</a:t>
+            </a:r>
+            <a:endParaRPr lang="en-US" dirty="0"/>
+          </a:p>
+        </p:txBody>
+      </p:sp>
+    </p:spTree>
+    <p:extLst>
+      <p:ext uri="{BB962C8B-B14F-4D97-AF65-F5344CB8AC3E}">
+        <p14:creationId xmlns:p14="http://schemas.microsoft.com/office/powerpoint/2010/main" val="74436960"/>
+      </p:ext>
+    </p:extLst>
+  </p:cSld>
+  <p:clrMapOvr>
+    <a:masterClrMapping/>
+  </p:clrMapOvr>
+</p:sld>
+</file>
+
+<file path=ppt/slides/slide5.xml><?xml version="1.0" encoding="utf-8"?>
+<p:sld xmlns:a="http://schemas.openxmlformats.org/drawingml/2006/main" xmlns:r="http://schemas.openxmlformats.org/officeDocument/2006/relationships" xmlns:p="http://schemas.openxmlformats.org/presentationml/2006/main">
+  <p:cSld>
+    <p:spTree>
+      <p:nvGrpSpPr>
+        <p:cNvPr id="1" name=""/>
+        <p:cNvGrpSpPr/>
+        <p:nvPr/>
+      </p:nvGrpSpPr>
+      <p:grpSpPr>
+        <a:xfrm>
+          <a:off x="0" y="0"/>
+          <a:ext cx="0" cy="0"/>
+          <a:chOff x="0" y="0"/>
+          <a:chExt cx="0" cy="0"/>
+        </a:xfrm>
+      </p:grpSpPr>
+      <p:sp>
+        <p:nvSpPr>
+          <p:cNvPr id="2" name="Rectangle 1"/>
+          <p:cNvSpPr/>
+          <p:nvPr/>
+        </p:nvSpPr>
+        <p:spPr>
+          <a:xfrm>
+            <a:off x="990600" y="838200"/>
+            <a:ext cx="1905000" cy="1143000"/>
+          </a:xfrm>
+          <a:prstGeom prst="rect">
+            <a:avLst/>
+          </a:prstGeom>
+        </p:spPr>
+        <p:style>
+          <a:lnRef idx="2">
+            <a:schemeClr val="accent1">
+              <a:shade val="50000"/>
+            </a:schemeClr>
+          </a:lnRef>
+          <a:fillRef idx="1">
+            <a:schemeClr val="accent1"/>
+          </a:fillRef>
+          <a:effectRef idx="0">
+            <a:schemeClr val="accent1"/>
+          </a:effectRef>
+          <a:fontRef idx="minor">
+            <a:schemeClr val="lt1"/>
+          </a:fontRef>
+        </p:style>
+        <p:txBody>
+          <a:bodyPr rtlCol="0" anchor="ctr"/>
+          <a:lstStyle/>
+          <a:p>
+            <a:pPr algn="ctr"/>
+            <a:r>
+              <a:rPr lang="en-US" dirty="0" smtClean="0"/>
+              <a:t>Client</a:t>
+            </a:r>
+            <a:endParaRPr lang="en-US" dirty="0"/>
+          </a:p>
+        </p:txBody>
+      </p:sp>
+      <p:sp>
+        <p:nvSpPr>
+          <p:cNvPr id="3" name="Rectangle 2"/>
+          <p:cNvSpPr/>
+          <p:nvPr/>
+        </p:nvSpPr>
+        <p:spPr>
+          <a:xfrm>
+            <a:off x="4572000" y="846909"/>
+            <a:ext cx="1905000" cy="1143000"/>
+          </a:xfrm>
+          <a:prstGeom prst="rect">
+            <a:avLst/>
+          </a:prstGeom>
+        </p:spPr>
+        <p:style>
+          <a:lnRef idx="2">
+            <a:schemeClr val="accent1">
+              <a:shade val="50000"/>
+            </a:schemeClr>
+          </a:lnRef>
+          <a:fillRef idx="1">
+            <a:schemeClr val="accent1"/>
+          </a:fillRef>
+          <a:effectRef idx="0">
+            <a:schemeClr val="accent1"/>
+          </a:effectRef>
+          <a:fontRef idx="minor">
+            <a:schemeClr val="lt1"/>
+          </a:fontRef>
+        </p:style>
+        <p:txBody>
+          <a:bodyPr rtlCol="0" anchor="ctr"/>
+          <a:lstStyle/>
+          <a:p>
+            <a:pPr algn="ctr"/>
+            <a:r>
+              <a:rPr lang="en-US" dirty="0" smtClean="0"/>
+              <a:t>Client</a:t>
+            </a:r>
+            <a:endParaRPr lang="en-US" dirty="0"/>
+          </a:p>
+        </p:txBody>
+      </p:sp>
+      <p:sp>
+        <p:nvSpPr>
+          <p:cNvPr id="4" name="Rectangle 3"/>
+          <p:cNvSpPr/>
+          <p:nvPr/>
+        </p:nvSpPr>
+        <p:spPr>
+          <a:xfrm>
+            <a:off x="2133600" y="3657600"/>
+            <a:ext cx="3124200" cy="1828800"/>
+          </a:xfrm>
+          <a:prstGeom prst="rect">
+            <a:avLst/>
+          </a:prstGeom>
+        </p:spPr>
+        <p:style>
+          <a:lnRef idx="2">
+            <a:schemeClr val="accent1">
+              <a:shade val="50000"/>
+            </a:schemeClr>
+          </a:lnRef>
+          <a:fillRef idx="1">
+            <a:schemeClr val="accent1"/>
+          </a:fillRef>
+          <a:effectRef idx="0">
+            <a:schemeClr val="accent1"/>
+          </a:effectRef>
+          <a:fontRef idx="minor">
+            <a:schemeClr val="lt1"/>
+          </a:fontRef>
+        </p:style>
+        <p:txBody>
+          <a:bodyPr rtlCol="0" anchor="ctr"/>
+          <a:lstStyle/>
+          <a:p>
+            <a:pPr algn="ctr"/>
+            <a:r>
+              <a:rPr lang="en-US" dirty="0" smtClean="0"/>
+              <a:t>Server</a:t>
+            </a:r>
+            <a:endParaRPr lang="en-US" dirty="0"/>
+          </a:p>
+        </p:txBody>
+      </p:sp>
+      <p:cxnSp>
+        <p:nvCxnSpPr>
+          <p:cNvPr id="6" name="Straight Arrow Connector 5"/>
+          <p:cNvCxnSpPr/>
+          <p:nvPr/>
+        </p:nvCxnSpPr>
+        <p:spPr>
+          <a:xfrm flipH="1" flipV="1">
+            <a:off x="1447800" y="1989909"/>
+            <a:ext cx="914400" cy="1667691"/>
+          </a:xfrm>
+          <a:prstGeom prst="straightConnector1">
+            <a:avLst/>
+          </a:prstGeom>
+          <a:ln>
+            <a:tailEnd type="triangle"/>
+          </a:ln>
+        </p:spPr>
+        <p:style>
+          <a:lnRef idx="1">
+            <a:schemeClr val="dk1"/>
+          </a:lnRef>
+          <a:fillRef idx="0">
+            <a:schemeClr val="dk1"/>
+          </a:fillRef>
+          <a:effectRef idx="0">
+            <a:schemeClr val="dk1"/>
+          </a:effectRef>
+          <a:fontRef idx="minor">
+            <a:schemeClr val="tx1"/>
+          </a:fontRef>
+        </p:style>
+      </p:cxnSp>
+      <p:sp>
+        <p:nvSpPr>
+          <p:cNvPr id="7" name="TextBox 6"/>
+          <p:cNvSpPr txBox="1"/>
+          <p:nvPr/>
+        </p:nvSpPr>
+        <p:spPr>
+          <a:xfrm>
+            <a:off x="562791" y="2514600"/>
+            <a:ext cx="1371600" cy="923330"/>
+          </a:xfrm>
+          <a:prstGeom prst="rect">
+            <a:avLst/>
+          </a:prstGeom>
+          <a:noFill/>
+        </p:spPr>
+        <p:txBody>
+          <a:bodyPr wrap="square" rtlCol="0">
+            <a:spAutoFit/>
+          </a:bodyPr>
+          <a:lstStyle/>
+          <a:p>
+            <a:pPr algn="ctr"/>
+            <a:r>
+              <a:rPr lang="en-US" dirty="0" smtClean="0"/>
+              <a:t>Information about the other client.</a:t>
+            </a:r>
+            <a:endParaRPr lang="en-US" dirty="0"/>
+          </a:p>
+        </p:txBody>
+      </p:sp>
+      <p:cxnSp>
+        <p:nvCxnSpPr>
+          <p:cNvPr id="9" name="Straight Arrow Connector 8"/>
+          <p:cNvCxnSpPr/>
+          <p:nvPr/>
+        </p:nvCxnSpPr>
+        <p:spPr>
+          <a:xfrm>
+            <a:off x="2133600" y="1989909"/>
+            <a:ext cx="838200" cy="1667691"/>
+          </a:xfrm>
+          <a:prstGeom prst="straightConnector1">
+            <a:avLst/>
+          </a:prstGeom>
+          <a:ln>
+            <a:tailEnd type="triangle"/>
+          </a:ln>
+        </p:spPr>
+        <p:style>
+          <a:lnRef idx="1">
+            <a:schemeClr val="dk1"/>
+          </a:lnRef>
+          <a:fillRef idx="0">
+            <a:schemeClr val="dk1"/>
+          </a:fillRef>
+          <a:effectRef idx="0">
+            <a:schemeClr val="dk1"/>
+          </a:effectRef>
+          <a:fontRef idx="minor">
+            <a:schemeClr val="tx1"/>
+          </a:fontRef>
+        </p:style>
+      </p:cxnSp>
+      <p:sp>
+        <p:nvSpPr>
+          <p:cNvPr id="10" name="TextBox 9"/>
+          <p:cNvSpPr txBox="1"/>
+          <p:nvPr/>
+        </p:nvSpPr>
+        <p:spPr>
+          <a:xfrm>
+            <a:off x="2752452" y="2211774"/>
+            <a:ext cx="1886495" cy="707886"/>
+          </a:xfrm>
+          <a:prstGeom prst="rect">
+            <a:avLst/>
+          </a:prstGeom>
+          <a:noFill/>
+        </p:spPr>
+        <p:txBody>
+          <a:bodyPr wrap="square" rtlCol="0">
+            <a:spAutoFit/>
+          </a:bodyPr>
+          <a:lstStyle/>
+          <a:p>
+            <a:pPr algn="ctr"/>
+            <a:r>
+              <a:rPr lang="en-US" sz="2000" dirty="0" smtClean="0"/>
+              <a:t>Client sends its info to server.</a:t>
+            </a:r>
+            <a:endParaRPr lang="en-US" sz="2000" dirty="0"/>
+          </a:p>
+        </p:txBody>
+      </p:sp>
+      <p:cxnSp>
+        <p:nvCxnSpPr>
+          <p:cNvPr id="12" name="Straight Arrow Connector 11"/>
+          <p:cNvCxnSpPr/>
+          <p:nvPr/>
+        </p:nvCxnSpPr>
+        <p:spPr>
+          <a:xfrm flipH="1">
+            <a:off x="4343400" y="1989909"/>
+            <a:ext cx="838200" cy="1667691"/>
+          </a:xfrm>
+          <a:prstGeom prst="straightConnector1">
+            <a:avLst/>
+          </a:prstGeom>
+          <a:ln>
+            <a:tailEnd type="triangle"/>
+          </a:ln>
+        </p:spPr>
+        <p:style>
+          <a:lnRef idx="1">
+            <a:schemeClr val="dk1"/>
+          </a:lnRef>
+          <a:fillRef idx="0">
+            <a:schemeClr val="dk1"/>
+          </a:fillRef>
+          <a:effectRef idx="0">
+            <a:schemeClr val="dk1"/>
+          </a:effectRef>
+          <a:fontRef idx="minor">
+            <a:schemeClr val="tx1"/>
+          </a:fontRef>
+        </p:style>
+      </p:cxnSp>
+      <p:cxnSp>
+        <p:nvCxnSpPr>
+          <p:cNvPr id="14" name="Straight Arrow Connector 13"/>
+          <p:cNvCxnSpPr/>
+          <p:nvPr/>
+        </p:nvCxnSpPr>
+        <p:spPr>
+          <a:xfrm flipV="1">
+            <a:off x="5105400" y="1981200"/>
+            <a:ext cx="762000" cy="1676400"/>
+          </a:xfrm>
+          <a:prstGeom prst="straightConnector1">
+            <a:avLst/>
+          </a:prstGeom>
+          <a:ln>
+            <a:tailEnd type="triangle"/>
+          </a:ln>
+        </p:spPr>
+        <p:style>
+          <a:lnRef idx="1">
+            <a:schemeClr val="dk1"/>
+          </a:lnRef>
+          <a:fillRef idx="0">
+            <a:schemeClr val="dk1"/>
+          </a:fillRef>
+          <a:effectRef idx="0">
+            <a:schemeClr val="dk1"/>
+          </a:effectRef>
+          <a:fontRef idx="minor">
+            <a:schemeClr val="tx1"/>
+          </a:fontRef>
+        </p:style>
+      </p:cxnSp>
+      <p:sp>
+        <p:nvSpPr>
+          <p:cNvPr id="15" name="TextBox 14"/>
+          <p:cNvSpPr txBox="1"/>
+          <p:nvPr/>
+        </p:nvSpPr>
+        <p:spPr>
+          <a:xfrm>
+            <a:off x="5652679" y="2542903"/>
+            <a:ext cx="1371600" cy="923330"/>
+          </a:xfrm>
+          <a:prstGeom prst="rect">
+            <a:avLst/>
+          </a:prstGeom>
+          <a:noFill/>
+        </p:spPr>
+        <p:txBody>
+          <a:bodyPr wrap="square" rtlCol="0">
+            <a:spAutoFit/>
+          </a:bodyPr>
+          <a:lstStyle/>
+          <a:p>
+            <a:pPr algn="ctr"/>
+            <a:r>
+              <a:rPr lang="en-US" dirty="0" smtClean="0"/>
+              <a:t>Information about the other client.</a:t>
+            </a:r>
+            <a:endParaRPr lang="en-US" dirty="0"/>
+          </a:p>
+        </p:txBody>
+      </p:sp>
+    </p:spTree>
+    <p:extLst>
+      <p:ext uri="{BB962C8B-B14F-4D97-AF65-F5344CB8AC3E}">
+        <p14:creationId xmlns:p14="http://schemas.microsoft.com/office/powerpoint/2010/main" val="389236855"/>
       </p:ext>
     </p:extLst>
   </p:cSld>

</xml_diff>

<commit_message>
Added instructions screen and rough draft of functional readme
</commit_message>
<xml_diff>
--- a/Design Doc Figures.pptx
+++ b/Design Doc Figures.pptx
@@ -113,7 +113,7 @@
   </p:defaultTextStyle>
   <p:extLst>
     <p:ext uri="{EFAFB233-063F-42B5-8137-9DF3F51BA10A}">
-      <p15:sldGuideLst xmlns:p15="http://schemas.microsoft.com/office/powerpoint/2012/main">
+      <p15:sldGuideLst xmlns:p15="http://schemas.microsoft.com/office/powerpoint/2012/main" xmlns="">
         <p15:guide id="1" orient="horz" pos="2160">
           <p15:clr>
             <a:srgbClr val="A4A3A4"/>
@@ -212,7 +212,7 @@
           <a:p>
             <a:fld id="{BAB10C68-15E3-49D5-A8A7-92C24BD58E90}" type="datetimeFigureOut">
               <a:rPr lang="en-US" smtClean="0"/>
-              <a:t>3/21/2014</a:t>
+              <a:t>3/27/2014</a:t>
             </a:fld>
             <a:endParaRPr lang="en-US"/>
           </a:p>
@@ -913,7 +913,7 @@
           <a:p>
             <a:fld id="{027BFF9F-D931-476A-B492-D9C71732684E}" type="datetimeFigureOut">
               <a:rPr lang="en-US" smtClean="0"/>
-              <a:t>3/21/2014</a:t>
+              <a:t>3/27/2014</a:t>
             </a:fld>
             <a:endParaRPr lang="en-US"/>
           </a:p>
@@ -1083,7 +1083,7 @@
           <a:p>
             <a:fld id="{027BFF9F-D931-476A-B492-D9C71732684E}" type="datetimeFigureOut">
               <a:rPr lang="en-US" smtClean="0"/>
-              <a:t>3/21/2014</a:t>
+              <a:t>3/27/2014</a:t>
             </a:fld>
             <a:endParaRPr lang="en-US"/>
           </a:p>
@@ -1263,7 +1263,7 @@
           <a:p>
             <a:fld id="{027BFF9F-D931-476A-B492-D9C71732684E}" type="datetimeFigureOut">
               <a:rPr lang="en-US" smtClean="0"/>
-              <a:t>3/21/2014</a:t>
+              <a:t>3/27/2014</a:t>
             </a:fld>
             <a:endParaRPr lang="en-US"/>
           </a:p>
@@ -1433,7 +1433,7 @@
           <a:p>
             <a:fld id="{027BFF9F-D931-476A-B492-D9C71732684E}" type="datetimeFigureOut">
               <a:rPr lang="en-US" smtClean="0"/>
-              <a:t>3/21/2014</a:t>
+              <a:t>3/27/2014</a:t>
             </a:fld>
             <a:endParaRPr lang="en-US"/>
           </a:p>
@@ -1679,7 +1679,7 @@
           <a:p>
             <a:fld id="{027BFF9F-D931-476A-B492-D9C71732684E}" type="datetimeFigureOut">
               <a:rPr lang="en-US" smtClean="0"/>
-              <a:t>3/21/2014</a:t>
+              <a:t>3/27/2014</a:t>
             </a:fld>
             <a:endParaRPr lang="en-US"/>
           </a:p>
@@ -1967,7 +1967,7 @@
           <a:p>
             <a:fld id="{027BFF9F-D931-476A-B492-D9C71732684E}" type="datetimeFigureOut">
               <a:rPr lang="en-US" smtClean="0"/>
-              <a:t>3/21/2014</a:t>
+              <a:t>3/27/2014</a:t>
             </a:fld>
             <a:endParaRPr lang="en-US"/>
           </a:p>
@@ -2389,7 +2389,7 @@
           <a:p>
             <a:fld id="{027BFF9F-D931-476A-B492-D9C71732684E}" type="datetimeFigureOut">
               <a:rPr lang="en-US" smtClean="0"/>
-              <a:t>3/21/2014</a:t>
+              <a:t>3/27/2014</a:t>
             </a:fld>
             <a:endParaRPr lang="en-US"/>
           </a:p>
@@ -2507,7 +2507,7 @@
           <a:p>
             <a:fld id="{027BFF9F-D931-476A-B492-D9C71732684E}" type="datetimeFigureOut">
               <a:rPr lang="en-US" smtClean="0"/>
-              <a:t>3/21/2014</a:t>
+              <a:t>3/27/2014</a:t>
             </a:fld>
             <a:endParaRPr lang="en-US"/>
           </a:p>
@@ -2602,7 +2602,7 @@
           <a:p>
             <a:fld id="{027BFF9F-D931-476A-B492-D9C71732684E}" type="datetimeFigureOut">
               <a:rPr lang="en-US" smtClean="0"/>
-              <a:t>3/21/2014</a:t>
+              <a:t>3/27/2014</a:t>
             </a:fld>
             <a:endParaRPr lang="en-US"/>
           </a:p>
@@ -2879,7 +2879,7 @@
           <a:p>
             <a:fld id="{027BFF9F-D931-476A-B492-D9C71732684E}" type="datetimeFigureOut">
               <a:rPr lang="en-US" smtClean="0"/>
-              <a:t>3/21/2014</a:t>
+              <a:t>3/27/2014</a:t>
             </a:fld>
             <a:endParaRPr lang="en-US"/>
           </a:p>
@@ -3132,7 +3132,7 @@
           <a:p>
             <a:fld id="{027BFF9F-D931-476A-B492-D9C71732684E}" type="datetimeFigureOut">
               <a:rPr lang="en-US" smtClean="0"/>
-              <a:t>3/21/2014</a:t>
+              <a:t>3/27/2014</a:t>
             </a:fld>
             <a:endParaRPr lang="en-US"/>
           </a:p>
@@ -3345,7 +3345,7 @@
           <a:p>
             <a:fld id="{027BFF9F-D931-476A-B492-D9C71732684E}" type="datetimeFigureOut">
               <a:rPr lang="en-US" smtClean="0"/>
-              <a:t>3/21/2014</a:t>
+              <a:t>3/27/2014</a:t>
             </a:fld>
             <a:endParaRPr lang="en-US"/>
           </a:p>

</xml_diff>

<commit_message>
Lots of work on the design doc. Tried to get it in-line with what we are actually doing. It stills needs some work, especially the highlighted parts.
</commit_message>
<xml_diff>
--- a/Design Doc Figures.pptx
+++ b/Design Doc Figures.pptx
@@ -5,7 +5,7 @@
     <p:sldMasterId id="2147483648" r:id="rId1"/>
   </p:sldMasterIdLst>
   <p:notesMasterIdLst>
-    <p:notesMasterId r:id="rId7"/>
+    <p:notesMasterId r:id="rId8"/>
   </p:notesMasterIdLst>
   <p:sldIdLst>
     <p:sldId id="256" r:id="rId2"/>
@@ -13,6 +13,7 @@
     <p:sldId id="258" r:id="rId4"/>
     <p:sldId id="259" r:id="rId5"/>
     <p:sldId id="260" r:id="rId6"/>
+    <p:sldId id="261" r:id="rId7"/>
   </p:sldIdLst>
   <p:sldSz cx="9144000" cy="6858000" type="screen4x3"/>
   <p:notesSz cx="6858000" cy="9144000"/>
@@ -113,7 +114,7 @@
   </p:defaultTextStyle>
   <p:extLst>
     <p:ext uri="{EFAFB233-063F-42B5-8137-9DF3F51BA10A}">
-      <p15:sldGuideLst xmlns:p15="http://schemas.microsoft.com/office/powerpoint/2012/main" xmlns="">
+      <p15:sldGuideLst xmlns:p15="http://schemas.microsoft.com/office/powerpoint/2012/main">
         <p15:guide id="1" orient="horz" pos="2160">
           <p15:clr>
             <a:srgbClr val="A4A3A4"/>
@@ -212,7 +213,7 @@
           <a:p>
             <a:fld id="{BAB10C68-15E3-49D5-A8A7-92C24BD58E90}" type="datetimeFigureOut">
               <a:rPr lang="en-US" smtClean="0"/>
-              <a:t>3/27/2014</a:t>
+              <a:t>4/3/2014</a:t>
             </a:fld>
             <a:endParaRPr lang="en-US"/>
           </a:p>
@@ -913,7 +914,7 @@
           <a:p>
             <a:fld id="{027BFF9F-D931-476A-B492-D9C71732684E}" type="datetimeFigureOut">
               <a:rPr lang="en-US" smtClean="0"/>
-              <a:t>3/27/2014</a:t>
+              <a:t>4/3/2014</a:t>
             </a:fld>
             <a:endParaRPr lang="en-US"/>
           </a:p>
@@ -1083,7 +1084,7 @@
           <a:p>
             <a:fld id="{027BFF9F-D931-476A-B492-D9C71732684E}" type="datetimeFigureOut">
               <a:rPr lang="en-US" smtClean="0"/>
-              <a:t>3/27/2014</a:t>
+              <a:t>4/3/2014</a:t>
             </a:fld>
             <a:endParaRPr lang="en-US"/>
           </a:p>
@@ -1263,7 +1264,7 @@
           <a:p>
             <a:fld id="{027BFF9F-D931-476A-B492-D9C71732684E}" type="datetimeFigureOut">
               <a:rPr lang="en-US" smtClean="0"/>
-              <a:t>3/27/2014</a:t>
+              <a:t>4/3/2014</a:t>
             </a:fld>
             <a:endParaRPr lang="en-US"/>
           </a:p>
@@ -1433,7 +1434,7 @@
           <a:p>
             <a:fld id="{027BFF9F-D931-476A-B492-D9C71732684E}" type="datetimeFigureOut">
               <a:rPr lang="en-US" smtClean="0"/>
-              <a:t>3/27/2014</a:t>
+              <a:t>4/3/2014</a:t>
             </a:fld>
             <a:endParaRPr lang="en-US"/>
           </a:p>
@@ -1679,7 +1680,7 @@
           <a:p>
             <a:fld id="{027BFF9F-D931-476A-B492-D9C71732684E}" type="datetimeFigureOut">
               <a:rPr lang="en-US" smtClean="0"/>
-              <a:t>3/27/2014</a:t>
+              <a:t>4/3/2014</a:t>
             </a:fld>
             <a:endParaRPr lang="en-US"/>
           </a:p>
@@ -1967,7 +1968,7 @@
           <a:p>
             <a:fld id="{027BFF9F-D931-476A-B492-D9C71732684E}" type="datetimeFigureOut">
               <a:rPr lang="en-US" smtClean="0"/>
-              <a:t>3/27/2014</a:t>
+              <a:t>4/3/2014</a:t>
             </a:fld>
             <a:endParaRPr lang="en-US"/>
           </a:p>
@@ -2389,7 +2390,7 @@
           <a:p>
             <a:fld id="{027BFF9F-D931-476A-B492-D9C71732684E}" type="datetimeFigureOut">
               <a:rPr lang="en-US" smtClean="0"/>
-              <a:t>3/27/2014</a:t>
+              <a:t>4/3/2014</a:t>
             </a:fld>
             <a:endParaRPr lang="en-US"/>
           </a:p>
@@ -2507,7 +2508,7 @@
           <a:p>
             <a:fld id="{027BFF9F-D931-476A-B492-D9C71732684E}" type="datetimeFigureOut">
               <a:rPr lang="en-US" smtClean="0"/>
-              <a:t>3/27/2014</a:t>
+              <a:t>4/3/2014</a:t>
             </a:fld>
             <a:endParaRPr lang="en-US"/>
           </a:p>
@@ -2602,7 +2603,7 @@
           <a:p>
             <a:fld id="{027BFF9F-D931-476A-B492-D9C71732684E}" type="datetimeFigureOut">
               <a:rPr lang="en-US" smtClean="0"/>
-              <a:t>3/27/2014</a:t>
+              <a:t>4/3/2014</a:t>
             </a:fld>
             <a:endParaRPr lang="en-US"/>
           </a:p>
@@ -2879,7 +2880,7 @@
           <a:p>
             <a:fld id="{027BFF9F-D931-476A-B492-D9C71732684E}" type="datetimeFigureOut">
               <a:rPr lang="en-US" smtClean="0"/>
-              <a:t>3/27/2014</a:t>
+              <a:t>4/3/2014</a:t>
             </a:fld>
             <a:endParaRPr lang="en-US"/>
           </a:p>
@@ -3132,7 +3133,7 @@
           <a:p>
             <a:fld id="{027BFF9F-D931-476A-B492-D9C71732684E}" type="datetimeFigureOut">
               <a:rPr lang="en-US" smtClean="0"/>
-              <a:t>3/27/2014</a:t>
+              <a:t>4/3/2014</a:t>
             </a:fld>
             <a:endParaRPr lang="en-US"/>
           </a:p>
@@ -3345,7 +3346,7 @@
           <a:p>
             <a:fld id="{027BFF9F-D931-476A-B492-D9C71732684E}" type="datetimeFigureOut">
               <a:rPr lang="en-US" smtClean="0"/>
-              <a:t>3/27/2014</a:t>
+              <a:t>4/3/2014</a:t>
             </a:fld>
             <a:endParaRPr lang="en-US"/>
           </a:p>
@@ -6787,6 +6788,386 @@
     <p:extLst>
       <p:ext uri="{BB962C8B-B14F-4D97-AF65-F5344CB8AC3E}">
         <p14:creationId xmlns:p14="http://schemas.microsoft.com/office/powerpoint/2010/main" val="389236855"/>
+      </p:ext>
+    </p:extLst>
+  </p:cSld>
+  <p:clrMapOvr>
+    <a:masterClrMapping/>
+  </p:clrMapOvr>
+</p:sld>
+</file>
+
+<file path=ppt/slides/slide6.xml><?xml version="1.0" encoding="utf-8"?>
+<p:sld xmlns:a="http://schemas.openxmlformats.org/drawingml/2006/main" xmlns:r="http://schemas.openxmlformats.org/officeDocument/2006/relationships" xmlns:p="http://schemas.openxmlformats.org/presentationml/2006/main">
+  <p:cSld>
+    <p:spTree>
+      <p:nvGrpSpPr>
+        <p:cNvPr id="1" name=""/>
+        <p:cNvGrpSpPr/>
+        <p:nvPr/>
+      </p:nvGrpSpPr>
+      <p:grpSpPr>
+        <a:xfrm>
+          <a:off x="0" y="0"/>
+          <a:ext cx="0" cy="0"/>
+          <a:chOff x="0" y="0"/>
+          <a:chExt cx="0" cy="0"/>
+        </a:xfrm>
+      </p:grpSpPr>
+      <p:sp>
+        <p:nvSpPr>
+          <p:cNvPr id="2" name="Rectangle 1"/>
+          <p:cNvSpPr/>
+          <p:nvPr/>
+        </p:nvSpPr>
+        <p:spPr>
+          <a:xfrm>
+            <a:off x="1219200" y="1371600"/>
+            <a:ext cx="5791200" cy="3352800"/>
+          </a:xfrm>
+          <a:prstGeom prst="rect">
+            <a:avLst/>
+          </a:prstGeom>
+        </p:spPr>
+        <p:style>
+          <a:lnRef idx="2">
+            <a:schemeClr val="accent1">
+              <a:shade val="50000"/>
+            </a:schemeClr>
+          </a:lnRef>
+          <a:fillRef idx="1">
+            <a:schemeClr val="accent1"/>
+          </a:fillRef>
+          <a:effectRef idx="0">
+            <a:schemeClr val="accent1"/>
+          </a:effectRef>
+          <a:fontRef idx="minor">
+            <a:schemeClr val="lt1"/>
+          </a:fontRef>
+        </p:style>
+        <p:txBody>
+          <a:bodyPr rtlCol="0" anchor="ctr"/>
+          <a:lstStyle/>
+          <a:p>
+            <a:pPr algn="ctr"/>
+            <a:endParaRPr lang="en-US"/>
+          </a:p>
+        </p:txBody>
+      </p:sp>
+      <p:sp>
+        <p:nvSpPr>
+          <p:cNvPr id="3" name="TextBox 2"/>
+          <p:cNvSpPr txBox="1"/>
+          <p:nvPr/>
+        </p:nvSpPr>
+        <p:spPr>
+          <a:xfrm>
+            <a:off x="2743200" y="762000"/>
+            <a:ext cx="2819400" cy="584775"/>
+          </a:xfrm>
+          <a:prstGeom prst="rect">
+            <a:avLst/>
+          </a:prstGeom>
+          <a:noFill/>
+        </p:spPr>
+        <p:txBody>
+          <a:bodyPr wrap="square" rtlCol="0">
+            <a:spAutoFit/>
+          </a:bodyPr>
+          <a:lstStyle/>
+          <a:p>
+            <a:pPr algn="ctr"/>
+            <a:r>
+              <a:rPr lang="en-US" sz="3200" dirty="0" smtClean="0"/>
+              <a:t>Player Object</a:t>
+            </a:r>
+            <a:endParaRPr lang="en-US" sz="3200" dirty="0"/>
+          </a:p>
+        </p:txBody>
+      </p:sp>
+      <p:cxnSp>
+        <p:nvCxnSpPr>
+          <p:cNvPr id="5" name="Straight Connector 4"/>
+          <p:cNvCxnSpPr>
+            <a:stCxn id="2" idx="1"/>
+            <a:endCxn id="2" idx="3"/>
+          </p:cNvCxnSpPr>
+          <p:nvPr/>
+        </p:nvCxnSpPr>
+        <p:spPr>
+          <a:xfrm>
+            <a:off x="1219200" y="3048000"/>
+            <a:ext cx="5791200" cy="0"/>
+          </a:xfrm>
+          <a:prstGeom prst="line">
+            <a:avLst/>
+          </a:prstGeom>
+        </p:spPr>
+        <p:style>
+          <a:lnRef idx="2">
+            <a:schemeClr val="dk1"/>
+          </a:lnRef>
+          <a:fillRef idx="0">
+            <a:schemeClr val="dk1"/>
+          </a:fillRef>
+          <a:effectRef idx="1">
+            <a:schemeClr val="dk1"/>
+          </a:effectRef>
+          <a:fontRef idx="minor">
+            <a:schemeClr val="tx1"/>
+          </a:fontRef>
+        </p:style>
+      </p:cxnSp>
+      <p:cxnSp>
+        <p:nvCxnSpPr>
+          <p:cNvPr id="7" name="Straight Connector 6"/>
+          <p:cNvCxnSpPr/>
+          <p:nvPr/>
+        </p:nvCxnSpPr>
+        <p:spPr>
+          <a:xfrm>
+            <a:off x="2971800" y="1371600"/>
+            <a:ext cx="0" cy="3352800"/>
+          </a:xfrm>
+          <a:prstGeom prst="line">
+            <a:avLst/>
+          </a:prstGeom>
+        </p:spPr>
+        <p:style>
+          <a:lnRef idx="2">
+            <a:schemeClr val="dk1"/>
+          </a:lnRef>
+          <a:fillRef idx="0">
+            <a:schemeClr val="dk1"/>
+          </a:fillRef>
+          <a:effectRef idx="1">
+            <a:schemeClr val="dk1"/>
+          </a:effectRef>
+          <a:fontRef idx="minor">
+            <a:schemeClr val="tx1"/>
+          </a:fontRef>
+        </p:style>
+      </p:cxnSp>
+      <p:cxnSp>
+        <p:nvCxnSpPr>
+          <p:cNvPr id="9" name="Straight Connector 8"/>
+          <p:cNvCxnSpPr/>
+          <p:nvPr/>
+        </p:nvCxnSpPr>
+        <p:spPr>
+          <a:xfrm>
+            <a:off x="5105400" y="1371600"/>
+            <a:ext cx="0" cy="3352800"/>
+          </a:xfrm>
+          <a:prstGeom prst="line">
+            <a:avLst/>
+          </a:prstGeom>
+        </p:spPr>
+        <p:style>
+          <a:lnRef idx="2">
+            <a:schemeClr val="dk1"/>
+          </a:lnRef>
+          <a:fillRef idx="0">
+            <a:schemeClr val="dk1"/>
+          </a:fillRef>
+          <a:effectRef idx="1">
+            <a:schemeClr val="dk1"/>
+          </a:effectRef>
+          <a:fontRef idx="minor">
+            <a:schemeClr val="tx1"/>
+          </a:fontRef>
+        </p:style>
+      </p:cxnSp>
+      <p:sp>
+        <p:nvSpPr>
+          <p:cNvPr id="14" name="TextBox 13"/>
+          <p:cNvSpPr txBox="1"/>
+          <p:nvPr/>
+        </p:nvSpPr>
+        <p:spPr>
+          <a:xfrm>
+            <a:off x="1307374" y="1707921"/>
+            <a:ext cx="1524000" cy="954107"/>
+          </a:xfrm>
+          <a:prstGeom prst="rect">
+            <a:avLst/>
+          </a:prstGeom>
+          <a:noFill/>
+        </p:spPr>
+        <p:txBody>
+          <a:bodyPr wrap="square" rtlCol="0">
+            <a:spAutoFit/>
+          </a:bodyPr>
+          <a:lstStyle/>
+          <a:p>
+            <a:pPr algn="ctr"/>
+            <a:r>
+              <a:rPr lang="en-US" sz="2800" dirty="0" smtClean="0"/>
+              <a:t>User Name</a:t>
+            </a:r>
+            <a:endParaRPr lang="en-US" sz="2800" dirty="0"/>
+          </a:p>
+        </p:txBody>
+      </p:sp>
+      <p:sp>
+        <p:nvSpPr>
+          <p:cNvPr id="15" name="TextBox 14"/>
+          <p:cNvSpPr txBox="1"/>
+          <p:nvPr/>
+        </p:nvSpPr>
+        <p:spPr>
+          <a:xfrm>
+            <a:off x="3238500" y="1923364"/>
+            <a:ext cx="1600200" cy="523220"/>
+          </a:xfrm>
+          <a:prstGeom prst="rect">
+            <a:avLst/>
+          </a:prstGeom>
+          <a:noFill/>
+        </p:spPr>
+        <p:txBody>
+          <a:bodyPr wrap="square" rtlCol="0">
+            <a:spAutoFit/>
+          </a:bodyPr>
+          <a:lstStyle/>
+          <a:p>
+            <a:pPr algn="ctr"/>
+            <a:r>
+              <a:rPr lang="en-US" sz="2800" dirty="0" smtClean="0"/>
+              <a:t>Password</a:t>
+            </a:r>
+            <a:endParaRPr lang="en-US" sz="2800" dirty="0"/>
+          </a:p>
+        </p:txBody>
+      </p:sp>
+      <p:sp>
+        <p:nvSpPr>
+          <p:cNvPr id="16" name="TextBox 15"/>
+          <p:cNvSpPr txBox="1"/>
+          <p:nvPr/>
+        </p:nvSpPr>
+        <p:spPr>
+          <a:xfrm>
+            <a:off x="5181600" y="1524000"/>
+            <a:ext cx="1752600" cy="1384995"/>
+          </a:xfrm>
+          <a:prstGeom prst="rect">
+            <a:avLst/>
+          </a:prstGeom>
+          <a:noFill/>
+        </p:spPr>
+        <p:txBody>
+          <a:bodyPr wrap="square" rtlCol="0">
+            <a:spAutoFit/>
+          </a:bodyPr>
+          <a:lstStyle/>
+          <a:p>
+            <a:pPr algn="ctr"/>
+            <a:r>
+              <a:rPr lang="en-US" sz="2800" dirty="0" smtClean="0"/>
+              <a:t>Current Game Mode</a:t>
+            </a:r>
+            <a:endParaRPr lang="en-US" sz="2800" dirty="0"/>
+          </a:p>
+        </p:txBody>
+      </p:sp>
+      <p:sp>
+        <p:nvSpPr>
+          <p:cNvPr id="17" name="TextBox 16"/>
+          <p:cNvSpPr txBox="1"/>
+          <p:nvPr/>
+        </p:nvSpPr>
+        <p:spPr>
+          <a:xfrm>
+            <a:off x="1307374" y="3193703"/>
+            <a:ext cx="1524000" cy="1384995"/>
+          </a:xfrm>
+          <a:prstGeom prst="rect">
+            <a:avLst/>
+          </a:prstGeom>
+          <a:noFill/>
+        </p:spPr>
+        <p:txBody>
+          <a:bodyPr wrap="square" rtlCol="0">
+            <a:spAutoFit/>
+          </a:bodyPr>
+          <a:lstStyle/>
+          <a:p>
+            <a:pPr algn="ctr"/>
+            <a:r>
+              <a:rPr lang="en-US" sz="2800" dirty="0" smtClean="0"/>
+              <a:t>Array of Top Race Times</a:t>
+            </a:r>
+            <a:endParaRPr lang="en-US" sz="2800" dirty="0"/>
+          </a:p>
+        </p:txBody>
+      </p:sp>
+      <p:sp>
+        <p:nvSpPr>
+          <p:cNvPr id="18" name="TextBox 17"/>
+          <p:cNvSpPr txBox="1"/>
+          <p:nvPr/>
+        </p:nvSpPr>
+        <p:spPr>
+          <a:xfrm>
+            <a:off x="3124200" y="3101370"/>
+            <a:ext cx="1828800" cy="1569660"/>
+          </a:xfrm>
+          <a:prstGeom prst="rect">
+            <a:avLst/>
+          </a:prstGeom>
+          <a:noFill/>
+        </p:spPr>
+        <p:txBody>
+          <a:bodyPr wrap="square" rtlCol="0">
+            <a:spAutoFit/>
+          </a:bodyPr>
+          <a:lstStyle/>
+          <a:p>
+            <a:pPr algn="ctr"/>
+            <a:r>
+              <a:rPr lang="en-US" sz="2400" dirty="0" smtClean="0"/>
+              <a:t>Array of Longest Challenge Distances</a:t>
+            </a:r>
+            <a:endParaRPr lang="en-US" sz="2400" dirty="0"/>
+          </a:p>
+        </p:txBody>
+      </p:sp>
+      <p:sp>
+        <p:nvSpPr>
+          <p:cNvPr id="19" name="TextBox 18"/>
+          <p:cNvSpPr txBox="1"/>
+          <p:nvPr/>
+        </p:nvSpPr>
+        <p:spPr>
+          <a:xfrm>
+            <a:off x="5181600" y="3439924"/>
+            <a:ext cx="1752600" cy="892552"/>
+          </a:xfrm>
+          <a:prstGeom prst="rect">
+            <a:avLst/>
+          </a:prstGeom>
+          <a:noFill/>
+        </p:spPr>
+        <p:txBody>
+          <a:bodyPr wrap="square" rtlCol="0">
+            <a:spAutoFit/>
+          </a:bodyPr>
+          <a:lstStyle/>
+          <a:p>
+            <a:pPr algn="ctr"/>
+            <a:r>
+              <a:rPr lang="en-US" sz="2600" dirty="0" smtClean="0"/>
+              <a:t>Multiplayer Rating</a:t>
+            </a:r>
+            <a:endParaRPr lang="en-US" sz="2600" dirty="0"/>
+          </a:p>
+        </p:txBody>
+      </p:sp>
+    </p:spTree>
+    <p:extLst>
+      <p:ext uri="{BB962C8B-B14F-4D97-AF65-F5344CB8AC3E}">
+        <p14:creationId xmlns:p14="http://schemas.microsoft.com/office/powerpoint/2010/main" val="100494850"/>
       </p:ext>
     </p:extLst>
   </p:cSld>

</xml_diff>

<commit_message>
minor revisions to the design doc.
</commit_message>
<xml_diff>
--- a/Design Doc Figures.pptx
+++ b/Design Doc Figures.pptx
@@ -213,7 +213,7 @@
           <a:p>
             <a:fld id="{BAB10C68-15E3-49D5-A8A7-92C24BD58E90}" type="datetimeFigureOut">
               <a:rPr lang="en-US" smtClean="0"/>
-              <a:t>4/3/2014</a:t>
+              <a:t>4/28/2014</a:t>
             </a:fld>
             <a:endParaRPr lang="en-US"/>
           </a:p>
@@ -914,7 +914,7 @@
           <a:p>
             <a:fld id="{027BFF9F-D931-476A-B492-D9C71732684E}" type="datetimeFigureOut">
               <a:rPr lang="en-US" smtClean="0"/>
-              <a:t>4/3/2014</a:t>
+              <a:t>4/28/2014</a:t>
             </a:fld>
             <a:endParaRPr lang="en-US"/>
           </a:p>
@@ -1084,7 +1084,7 @@
           <a:p>
             <a:fld id="{027BFF9F-D931-476A-B492-D9C71732684E}" type="datetimeFigureOut">
               <a:rPr lang="en-US" smtClean="0"/>
-              <a:t>4/3/2014</a:t>
+              <a:t>4/28/2014</a:t>
             </a:fld>
             <a:endParaRPr lang="en-US"/>
           </a:p>
@@ -1264,7 +1264,7 @@
           <a:p>
             <a:fld id="{027BFF9F-D931-476A-B492-D9C71732684E}" type="datetimeFigureOut">
               <a:rPr lang="en-US" smtClean="0"/>
-              <a:t>4/3/2014</a:t>
+              <a:t>4/28/2014</a:t>
             </a:fld>
             <a:endParaRPr lang="en-US"/>
           </a:p>
@@ -1434,7 +1434,7 @@
           <a:p>
             <a:fld id="{027BFF9F-D931-476A-B492-D9C71732684E}" type="datetimeFigureOut">
               <a:rPr lang="en-US" smtClean="0"/>
-              <a:t>4/3/2014</a:t>
+              <a:t>4/28/2014</a:t>
             </a:fld>
             <a:endParaRPr lang="en-US"/>
           </a:p>
@@ -1680,7 +1680,7 @@
           <a:p>
             <a:fld id="{027BFF9F-D931-476A-B492-D9C71732684E}" type="datetimeFigureOut">
               <a:rPr lang="en-US" smtClean="0"/>
-              <a:t>4/3/2014</a:t>
+              <a:t>4/28/2014</a:t>
             </a:fld>
             <a:endParaRPr lang="en-US"/>
           </a:p>
@@ -1968,7 +1968,7 @@
           <a:p>
             <a:fld id="{027BFF9F-D931-476A-B492-D9C71732684E}" type="datetimeFigureOut">
               <a:rPr lang="en-US" smtClean="0"/>
-              <a:t>4/3/2014</a:t>
+              <a:t>4/28/2014</a:t>
             </a:fld>
             <a:endParaRPr lang="en-US"/>
           </a:p>
@@ -2390,7 +2390,7 @@
           <a:p>
             <a:fld id="{027BFF9F-D931-476A-B492-D9C71732684E}" type="datetimeFigureOut">
               <a:rPr lang="en-US" smtClean="0"/>
-              <a:t>4/3/2014</a:t>
+              <a:t>4/28/2014</a:t>
             </a:fld>
             <a:endParaRPr lang="en-US"/>
           </a:p>
@@ -2508,7 +2508,7 @@
           <a:p>
             <a:fld id="{027BFF9F-D931-476A-B492-D9C71732684E}" type="datetimeFigureOut">
               <a:rPr lang="en-US" smtClean="0"/>
-              <a:t>4/3/2014</a:t>
+              <a:t>4/28/2014</a:t>
             </a:fld>
             <a:endParaRPr lang="en-US"/>
           </a:p>
@@ -2603,7 +2603,7 @@
           <a:p>
             <a:fld id="{027BFF9F-D931-476A-B492-D9C71732684E}" type="datetimeFigureOut">
               <a:rPr lang="en-US" smtClean="0"/>
-              <a:t>4/3/2014</a:t>
+              <a:t>4/28/2014</a:t>
             </a:fld>
             <a:endParaRPr lang="en-US"/>
           </a:p>
@@ -2880,7 +2880,7 @@
           <a:p>
             <a:fld id="{027BFF9F-D931-476A-B492-D9C71732684E}" type="datetimeFigureOut">
               <a:rPr lang="en-US" smtClean="0"/>
-              <a:t>4/3/2014</a:t>
+              <a:t>4/28/2014</a:t>
             </a:fld>
             <a:endParaRPr lang="en-US"/>
           </a:p>
@@ -3133,7 +3133,7 @@
           <a:p>
             <a:fld id="{027BFF9F-D931-476A-B492-D9C71732684E}" type="datetimeFigureOut">
               <a:rPr lang="en-US" smtClean="0"/>
-              <a:t>4/3/2014</a:t>
+              <a:t>4/28/2014</a:t>
             </a:fld>
             <a:endParaRPr lang="en-US"/>
           </a:p>
@@ -3346,7 +3346,7 @@
           <a:p>
             <a:fld id="{027BFF9F-D931-476A-B492-D9C71732684E}" type="datetimeFigureOut">
               <a:rPr lang="en-US" smtClean="0"/>
-              <a:t>4/3/2014</a:t>
+              <a:t>4/28/2014</a:t>
             </a:fld>
             <a:endParaRPr lang="en-US"/>
           </a:p>
@@ -6918,16 +6918,171 @@
           </a:fontRef>
         </p:style>
       </p:cxnSp>
+      <p:sp>
+        <p:nvSpPr>
+          <p:cNvPr id="14" name="TextBox 13"/>
+          <p:cNvSpPr txBox="1"/>
+          <p:nvPr/>
+        </p:nvSpPr>
+        <p:spPr>
+          <a:xfrm>
+            <a:off x="1524000" y="1948189"/>
+            <a:ext cx="1981200" cy="523220"/>
+          </a:xfrm>
+          <a:prstGeom prst="rect">
+            <a:avLst/>
+          </a:prstGeom>
+          <a:noFill/>
+        </p:spPr>
+        <p:txBody>
+          <a:bodyPr wrap="square" rtlCol="0">
+            <a:spAutoFit/>
+          </a:bodyPr>
+          <a:lstStyle/>
+          <a:p>
+            <a:pPr algn="ctr"/>
+            <a:r>
+              <a:rPr lang="en-US" sz="2800" dirty="0" smtClean="0"/>
+              <a:t>User Name</a:t>
+            </a:r>
+            <a:endParaRPr lang="en-US" sz="2800" dirty="0"/>
+          </a:p>
+        </p:txBody>
+      </p:sp>
+      <p:sp>
+        <p:nvSpPr>
+          <p:cNvPr id="16" name="TextBox 15"/>
+          <p:cNvSpPr txBox="1"/>
+          <p:nvPr/>
+        </p:nvSpPr>
+        <p:spPr>
+          <a:xfrm>
+            <a:off x="4267200" y="1732746"/>
+            <a:ext cx="2304506" cy="954107"/>
+          </a:xfrm>
+          <a:prstGeom prst="rect">
+            <a:avLst/>
+          </a:prstGeom>
+          <a:noFill/>
+        </p:spPr>
+        <p:txBody>
+          <a:bodyPr wrap="square" rtlCol="0">
+            <a:spAutoFit/>
+          </a:bodyPr>
+          <a:lstStyle/>
+          <a:p>
+            <a:pPr algn="ctr"/>
+            <a:r>
+              <a:rPr lang="en-US" sz="2800" dirty="0" smtClean="0"/>
+              <a:t>Current Game Mode</a:t>
+            </a:r>
+            <a:endParaRPr lang="en-US" sz="2800" dirty="0"/>
+          </a:p>
+        </p:txBody>
+      </p:sp>
+      <p:sp>
+        <p:nvSpPr>
+          <p:cNvPr id="17" name="TextBox 16"/>
+          <p:cNvSpPr txBox="1"/>
+          <p:nvPr/>
+        </p:nvSpPr>
+        <p:spPr>
+          <a:xfrm>
+            <a:off x="1307374" y="3193703"/>
+            <a:ext cx="1524000" cy="1384995"/>
+          </a:xfrm>
+          <a:prstGeom prst="rect">
+            <a:avLst/>
+          </a:prstGeom>
+          <a:noFill/>
+        </p:spPr>
+        <p:txBody>
+          <a:bodyPr wrap="square" rtlCol="0">
+            <a:spAutoFit/>
+          </a:bodyPr>
+          <a:lstStyle/>
+          <a:p>
+            <a:pPr algn="ctr"/>
+            <a:r>
+              <a:rPr lang="en-US" sz="2800" dirty="0" smtClean="0"/>
+              <a:t>Array of Top Race Times</a:t>
+            </a:r>
+            <a:endParaRPr lang="en-US" sz="2800" dirty="0"/>
+          </a:p>
+        </p:txBody>
+      </p:sp>
+      <p:sp>
+        <p:nvSpPr>
+          <p:cNvPr id="18" name="TextBox 17"/>
+          <p:cNvSpPr txBox="1"/>
+          <p:nvPr/>
+        </p:nvSpPr>
+        <p:spPr>
+          <a:xfrm>
+            <a:off x="3124200" y="3101370"/>
+            <a:ext cx="1828800" cy="1569660"/>
+          </a:xfrm>
+          <a:prstGeom prst="rect">
+            <a:avLst/>
+          </a:prstGeom>
+          <a:noFill/>
+        </p:spPr>
+        <p:txBody>
+          <a:bodyPr wrap="square" rtlCol="0">
+            <a:spAutoFit/>
+          </a:bodyPr>
+          <a:lstStyle/>
+          <a:p>
+            <a:pPr algn="ctr"/>
+            <a:r>
+              <a:rPr lang="en-US" sz="2400" dirty="0" smtClean="0"/>
+              <a:t>Array of Longest Challenge Distances</a:t>
+            </a:r>
+            <a:endParaRPr lang="en-US" sz="2400" dirty="0"/>
+          </a:p>
+        </p:txBody>
+      </p:sp>
+      <p:sp>
+        <p:nvSpPr>
+          <p:cNvPr id="19" name="TextBox 18"/>
+          <p:cNvSpPr txBox="1"/>
+          <p:nvPr/>
+        </p:nvSpPr>
+        <p:spPr>
+          <a:xfrm>
+            <a:off x="5181600" y="3439924"/>
+            <a:ext cx="1752600" cy="892552"/>
+          </a:xfrm>
+          <a:prstGeom prst="rect">
+            <a:avLst/>
+          </a:prstGeom>
+          <a:noFill/>
+        </p:spPr>
+        <p:txBody>
+          <a:bodyPr wrap="square" rtlCol="0">
+            <a:spAutoFit/>
+          </a:bodyPr>
+          <a:lstStyle/>
+          <a:p>
+            <a:pPr algn="ctr"/>
+            <a:r>
+              <a:rPr lang="en-US" sz="2600" dirty="0" smtClean="0"/>
+              <a:t>Multiplayer Rating</a:t>
+            </a:r>
+            <a:endParaRPr lang="en-US" sz="2600" dirty="0"/>
+          </a:p>
+        </p:txBody>
+      </p:sp>
       <p:cxnSp>
         <p:nvCxnSpPr>
-          <p:cNvPr id="7" name="Straight Connector 6"/>
+          <p:cNvPr id="6" name="Straight Connector 5"/>
           <p:cNvCxnSpPr/>
           <p:nvPr/>
         </p:nvCxnSpPr>
         <p:spPr>
-          <a:xfrm>
-            <a:off x="2971800" y="1371600"/>
-            <a:ext cx="0" cy="3352800"/>
+          <a:xfrm flipV="1">
+            <a:off x="3048000" y="3048000"/>
+            <a:ext cx="0" cy="1676400"/>
           </a:xfrm>
           <a:prstGeom prst="line">
             <a:avLst/>
@@ -6950,14 +7105,14 @@
       </p:cxnSp>
       <p:cxnSp>
         <p:nvCxnSpPr>
-          <p:cNvPr id="9" name="Straight Connector 8"/>
+          <p:cNvPr id="20" name="Straight Connector 19"/>
           <p:cNvCxnSpPr/>
           <p:nvPr/>
         </p:nvCxnSpPr>
         <p:spPr>
-          <a:xfrm>
-            <a:off x="5105400" y="1371600"/>
-            <a:ext cx="0" cy="3352800"/>
+          <a:xfrm flipV="1">
+            <a:off x="5029200" y="3048000"/>
+            <a:ext cx="0" cy="1676400"/>
           </a:xfrm>
           <a:prstGeom prst="line">
             <a:avLst/>
@@ -6978,192 +7133,36 @@
           </a:fontRef>
         </p:style>
       </p:cxnSp>
-      <p:sp>
-        <p:nvSpPr>
-          <p:cNvPr id="14" name="TextBox 13"/>
-          <p:cNvSpPr txBox="1"/>
-          <p:nvPr/>
-        </p:nvSpPr>
-        <p:spPr>
-          <a:xfrm>
-            <a:off x="1307374" y="1707921"/>
-            <a:ext cx="1524000" cy="954107"/>
-          </a:xfrm>
-          <a:prstGeom prst="rect">
-            <a:avLst/>
-          </a:prstGeom>
-          <a:noFill/>
-        </p:spPr>
-        <p:txBody>
-          <a:bodyPr wrap="square" rtlCol="0">
-            <a:spAutoFit/>
-          </a:bodyPr>
-          <a:lstStyle/>
-          <a:p>
-            <a:pPr algn="ctr"/>
-            <a:r>
-              <a:rPr lang="en-US" sz="2800" dirty="0" smtClean="0"/>
-              <a:t>User Name</a:t>
-            </a:r>
-            <a:endParaRPr lang="en-US" sz="2800" dirty="0"/>
-          </a:p>
-        </p:txBody>
-      </p:sp>
-      <p:sp>
-        <p:nvSpPr>
-          <p:cNvPr id="15" name="TextBox 14"/>
-          <p:cNvSpPr txBox="1"/>
-          <p:nvPr/>
-        </p:nvSpPr>
-        <p:spPr>
-          <a:xfrm>
-            <a:off x="3238500" y="1923364"/>
-            <a:ext cx="1600200" cy="523220"/>
-          </a:xfrm>
-          <a:prstGeom prst="rect">
-            <a:avLst/>
-          </a:prstGeom>
-          <a:noFill/>
-        </p:spPr>
-        <p:txBody>
-          <a:bodyPr wrap="square" rtlCol="0">
-            <a:spAutoFit/>
-          </a:bodyPr>
-          <a:lstStyle/>
-          <a:p>
-            <a:pPr algn="ctr"/>
-            <a:r>
-              <a:rPr lang="en-US" sz="2800" dirty="0" smtClean="0"/>
-              <a:t>Password</a:t>
-            </a:r>
-            <a:endParaRPr lang="en-US" sz="2800" dirty="0"/>
-          </a:p>
-        </p:txBody>
-      </p:sp>
-      <p:sp>
-        <p:nvSpPr>
-          <p:cNvPr id="16" name="TextBox 15"/>
-          <p:cNvSpPr txBox="1"/>
-          <p:nvPr/>
-        </p:nvSpPr>
-        <p:spPr>
-          <a:xfrm>
-            <a:off x="5181600" y="1524000"/>
-            <a:ext cx="1752600" cy="1384995"/>
-          </a:xfrm>
-          <a:prstGeom prst="rect">
-            <a:avLst/>
-          </a:prstGeom>
-          <a:noFill/>
-        </p:spPr>
-        <p:txBody>
-          <a:bodyPr wrap="square" rtlCol="0">
-            <a:spAutoFit/>
-          </a:bodyPr>
-          <a:lstStyle/>
-          <a:p>
-            <a:pPr algn="ctr"/>
-            <a:r>
-              <a:rPr lang="en-US" sz="2800" dirty="0" smtClean="0"/>
-              <a:t>Current Game Mode</a:t>
-            </a:r>
-            <a:endParaRPr lang="en-US" sz="2800" dirty="0"/>
-          </a:p>
-        </p:txBody>
-      </p:sp>
-      <p:sp>
-        <p:nvSpPr>
-          <p:cNvPr id="17" name="TextBox 16"/>
-          <p:cNvSpPr txBox="1"/>
-          <p:nvPr/>
-        </p:nvSpPr>
-        <p:spPr>
-          <a:xfrm>
-            <a:off x="1307374" y="3193703"/>
-            <a:ext cx="1524000" cy="1384995"/>
-          </a:xfrm>
-          <a:prstGeom prst="rect">
-            <a:avLst/>
-          </a:prstGeom>
-          <a:noFill/>
-        </p:spPr>
-        <p:txBody>
-          <a:bodyPr wrap="square" rtlCol="0">
-            <a:spAutoFit/>
-          </a:bodyPr>
-          <a:lstStyle/>
-          <a:p>
-            <a:pPr algn="ctr"/>
-            <a:r>
-              <a:rPr lang="en-US" sz="2800" dirty="0" smtClean="0"/>
-              <a:t>Array of Top Race Times</a:t>
-            </a:r>
-            <a:endParaRPr lang="en-US" sz="2800" dirty="0"/>
-          </a:p>
-        </p:txBody>
-      </p:sp>
-      <p:sp>
-        <p:nvSpPr>
-          <p:cNvPr id="18" name="TextBox 17"/>
-          <p:cNvSpPr txBox="1"/>
-          <p:nvPr/>
-        </p:nvSpPr>
-        <p:spPr>
-          <a:xfrm>
-            <a:off x="3124200" y="3101370"/>
-            <a:ext cx="1828800" cy="1569660"/>
-          </a:xfrm>
-          <a:prstGeom prst="rect">
-            <a:avLst/>
-          </a:prstGeom>
-          <a:noFill/>
-        </p:spPr>
-        <p:txBody>
-          <a:bodyPr wrap="square" rtlCol="0">
-            <a:spAutoFit/>
-          </a:bodyPr>
-          <a:lstStyle/>
-          <a:p>
-            <a:pPr algn="ctr"/>
-            <a:r>
-              <a:rPr lang="en-US" sz="2400" dirty="0" smtClean="0"/>
-              <a:t>Array of Longest Challenge Distances</a:t>
-            </a:r>
-            <a:endParaRPr lang="en-US" sz="2400" dirty="0"/>
-          </a:p>
-        </p:txBody>
-      </p:sp>
-      <p:sp>
-        <p:nvSpPr>
-          <p:cNvPr id="19" name="TextBox 18"/>
-          <p:cNvSpPr txBox="1"/>
-          <p:nvPr/>
-        </p:nvSpPr>
-        <p:spPr>
-          <a:xfrm>
-            <a:off x="5181600" y="3439924"/>
-            <a:ext cx="1752600" cy="892552"/>
-          </a:xfrm>
-          <a:prstGeom prst="rect">
-            <a:avLst/>
-          </a:prstGeom>
-          <a:noFill/>
-        </p:spPr>
-        <p:txBody>
-          <a:bodyPr wrap="square" rtlCol="0">
-            <a:spAutoFit/>
-          </a:bodyPr>
-          <a:lstStyle/>
-          <a:p>
-            <a:pPr algn="ctr"/>
-            <a:r>
-              <a:rPr lang="en-US" sz="2600" dirty="0" smtClean="0"/>
-              <a:t>Multiplayer Rating</a:t>
-            </a:r>
-            <a:endParaRPr lang="en-US" sz="2600" dirty="0"/>
-          </a:p>
-        </p:txBody>
-      </p:sp>
+      <p:cxnSp>
+        <p:nvCxnSpPr>
+          <p:cNvPr id="21" name="Straight Connector 20"/>
+          <p:cNvCxnSpPr/>
+          <p:nvPr/>
+        </p:nvCxnSpPr>
+        <p:spPr>
+          <a:xfrm flipV="1">
+            <a:off x="3962400" y="1371600"/>
+            <a:ext cx="0" cy="1676400"/>
+          </a:xfrm>
+          <a:prstGeom prst="line">
+            <a:avLst/>
+          </a:prstGeom>
+        </p:spPr>
+        <p:style>
+          <a:lnRef idx="2">
+            <a:schemeClr val="dk1"/>
+          </a:lnRef>
+          <a:fillRef idx="0">
+            <a:schemeClr val="dk1"/>
+          </a:fillRef>
+          <a:effectRef idx="1">
+            <a:schemeClr val="dk1"/>
+          </a:effectRef>
+          <a:fontRef idx="minor">
+            <a:schemeClr val="tx1"/>
+          </a:fontRef>
+        </p:style>
+      </p:cxnSp>
     </p:spTree>
     <p:extLst>
       <p:ext uri="{BB962C8B-B14F-4D97-AF65-F5344CB8AC3E}">

</xml_diff>